<commit_message>
up to lecture 43
</commit_message>
<xml_diff>
--- a/Slides/PH223_Lecture_37.pptx
+++ b/Slides/PH223_Lecture_37.pptx
@@ -4,14 +4,29 @@
   <p:sldMasterIdLst>
     <p:sldMasterId id="2147483648" r:id="rId1"/>
   </p:sldMasterIdLst>
+  <p:notesMasterIdLst>
+    <p:notesMasterId r:id="rId21"/>
+  </p:notesMasterIdLst>
   <p:sldIdLst>
-    <p:sldId id="265" r:id="rId2"/>
-    <p:sldId id="269" r:id="rId3"/>
-    <p:sldId id="267" r:id="rId4"/>
-    <p:sldId id="268" r:id="rId5"/>
-    <p:sldId id="259" r:id="rId6"/>
-    <p:sldId id="260" r:id="rId7"/>
-    <p:sldId id="261" r:id="rId8"/>
+    <p:sldId id="1164" r:id="rId2"/>
+    <p:sldId id="1440" r:id="rId3"/>
+    <p:sldId id="1165" r:id="rId4"/>
+    <p:sldId id="265" r:id="rId5"/>
+    <p:sldId id="1166" r:id="rId6"/>
+    <p:sldId id="269" r:id="rId7"/>
+    <p:sldId id="1167" r:id="rId8"/>
+    <p:sldId id="267" r:id="rId9"/>
+    <p:sldId id="268" r:id="rId10"/>
+    <p:sldId id="1439" r:id="rId11"/>
+    <p:sldId id="259" r:id="rId12"/>
+    <p:sldId id="260" r:id="rId13"/>
+    <p:sldId id="261" r:id="rId14"/>
+    <p:sldId id="1168" r:id="rId15"/>
+    <p:sldId id="785" r:id="rId16"/>
+    <p:sldId id="1318" r:id="rId17"/>
+    <p:sldId id="1442" r:id="rId18"/>
+    <p:sldId id="1443" r:id="rId19"/>
+    <p:sldId id="1441" r:id="rId20"/>
   </p:sldIdLst>
   <p:sldSz cx="9144000" cy="6858000" type="screen4x3"/>
   <p:notesSz cx="6858000" cy="9144000"/>
@@ -110,7 +125,710 @@
       </a:defRPr>
     </a:lvl9pPr>
   </p:defaultTextStyle>
+  <p:extLst>
+    <p:ext uri="{EFAFB233-063F-42B5-8137-9DF3F51BA10A}">
+      <p15:sldGuideLst xmlns:p15="http://schemas.microsoft.com/office/powerpoint/2012/main">
+        <p15:guide id="1" orient="horz" pos="2160">
+          <p15:clr>
+            <a:srgbClr val="A4A3A4"/>
+          </p15:clr>
+        </p15:guide>
+        <p15:guide id="2" pos="2880">
+          <p15:clr>
+            <a:srgbClr val="A4A3A4"/>
+          </p15:clr>
+        </p15:guide>
+      </p15:sldGuideLst>
+    </p:ext>
+  </p:extLst>
 </p:presentation>
+</file>
+
+<file path=ppt/revisionInfo.xml><?xml version="1.0" encoding="utf-8"?>
+<p1510:revInfo xmlns:a="http://schemas.openxmlformats.org/drawingml/2006/main" xmlns:r="http://schemas.openxmlformats.org/officeDocument/2006/relationships" xmlns:p1510="http://schemas.microsoft.com/office/powerpoint/2015/10/main">
+  <p1510:revLst>
+    <p1510:client id="{662FAC65-0189-436D-8148-A415797AC138}" v="1" dt="2023-11-11T19:28:22.536"/>
+  </p1510:revLst>
+</p1510:revInfo>
+</file>
+
+<file path=ppt/changesInfos/changesInfo1.xml><?xml version="1.0" encoding="utf-8"?>
+<pc:chgInfo xmlns:a="http://schemas.openxmlformats.org/drawingml/2006/main" xmlns:r="http://schemas.openxmlformats.org/officeDocument/2006/relationships" xmlns:ac="http://schemas.microsoft.com/office/drawing/2013/main/command" xmlns:pc="http://schemas.microsoft.com/office/powerpoint/2013/main/command">
+  <pc:docChgLst>
+    <pc:chgData name="Lines, Todd" userId="afaf7c3a-e8aa-4568-882a-02ad8f9e19b0" providerId="ADAL" clId="{662FAC65-0189-436D-8148-A415797AC138}"/>
+    <pc:docChg chg="custSel addSld modSld sldOrd">
+      <pc:chgData name="Lines, Todd" userId="afaf7c3a-e8aa-4568-882a-02ad8f9e19b0" providerId="ADAL" clId="{662FAC65-0189-436D-8148-A415797AC138}" dt="2023-11-14T17:34:08.727" v="539" actId="22"/>
+      <pc:docMkLst>
+        <pc:docMk/>
+      </pc:docMkLst>
+      <pc:sldChg chg="modSp add mod ord">
+        <pc:chgData name="Lines, Todd" userId="afaf7c3a-e8aa-4568-882a-02ad8f9e19b0" providerId="ADAL" clId="{662FAC65-0189-436D-8148-A415797AC138}" dt="2023-11-11T19:53:16.086" v="531" actId="1076"/>
+        <pc:sldMkLst>
+          <pc:docMk/>
+          <pc:sldMk cId="0" sldId="785"/>
+        </pc:sldMkLst>
+        <pc:spChg chg="mod">
+          <ac:chgData name="Lines, Todd" userId="afaf7c3a-e8aa-4568-882a-02ad8f9e19b0" providerId="ADAL" clId="{662FAC65-0189-436D-8148-A415797AC138}" dt="2023-11-11T19:53:16.086" v="531" actId="1076"/>
+          <ac:spMkLst>
+            <pc:docMk/>
+            <pc:sldMk cId="0" sldId="785"/>
+            <ac:spMk id="1560585" creationId="{00000000-0000-0000-0000-000000000000}"/>
+          </ac:spMkLst>
+        </pc:spChg>
+      </pc:sldChg>
+      <pc:sldChg chg="add ord">
+        <pc:chgData name="Lines, Todd" userId="afaf7c3a-e8aa-4568-882a-02ad8f9e19b0" providerId="ADAL" clId="{662FAC65-0189-436D-8148-A415797AC138}" dt="2023-11-11T19:28:35.171" v="2"/>
+        <pc:sldMkLst>
+          <pc:docMk/>
+          <pc:sldMk cId="0" sldId="1164"/>
+        </pc:sldMkLst>
+      </pc:sldChg>
+      <pc:sldChg chg="add ord">
+        <pc:chgData name="Lines, Todd" userId="afaf7c3a-e8aa-4568-882a-02ad8f9e19b0" providerId="ADAL" clId="{662FAC65-0189-436D-8148-A415797AC138}" dt="2023-11-11T19:31:59.921" v="4"/>
+        <pc:sldMkLst>
+          <pc:docMk/>
+          <pc:sldMk cId="0" sldId="1165"/>
+        </pc:sldMkLst>
+      </pc:sldChg>
+      <pc:sldChg chg="add ord">
+        <pc:chgData name="Lines, Todd" userId="afaf7c3a-e8aa-4568-882a-02ad8f9e19b0" providerId="ADAL" clId="{662FAC65-0189-436D-8148-A415797AC138}" dt="2023-11-11T19:38:31.899" v="522"/>
+        <pc:sldMkLst>
+          <pc:docMk/>
+          <pc:sldMk cId="0" sldId="1166"/>
+        </pc:sldMkLst>
+      </pc:sldChg>
+      <pc:sldChg chg="add ord">
+        <pc:chgData name="Lines, Todd" userId="afaf7c3a-e8aa-4568-882a-02ad8f9e19b0" providerId="ADAL" clId="{662FAC65-0189-436D-8148-A415797AC138}" dt="2023-11-11T19:43:27.025" v="524"/>
+        <pc:sldMkLst>
+          <pc:docMk/>
+          <pc:sldMk cId="0" sldId="1167"/>
+        </pc:sldMkLst>
+      </pc:sldChg>
+      <pc:sldChg chg="add ord">
+        <pc:chgData name="Lines, Todd" userId="afaf7c3a-e8aa-4568-882a-02ad8f9e19b0" providerId="ADAL" clId="{662FAC65-0189-436D-8148-A415797AC138}" dt="2023-11-11T19:53:08.398" v="530"/>
+        <pc:sldMkLst>
+          <pc:docMk/>
+          <pc:sldMk cId="0" sldId="1168"/>
+        </pc:sldMkLst>
+      </pc:sldChg>
+      <pc:sldChg chg="add">
+        <pc:chgData name="Lines, Todd" userId="afaf7c3a-e8aa-4568-882a-02ad8f9e19b0" providerId="ADAL" clId="{662FAC65-0189-436D-8148-A415797AC138}" dt="2023-11-11T19:28:22.526" v="0"/>
+        <pc:sldMkLst>
+          <pc:docMk/>
+          <pc:sldMk cId="0" sldId="1318"/>
+        </pc:sldMkLst>
+      </pc:sldChg>
+      <pc:sldChg chg="add ord">
+        <pc:chgData name="Lines, Todd" userId="afaf7c3a-e8aa-4568-882a-02ad8f9e19b0" providerId="ADAL" clId="{662FAC65-0189-436D-8148-A415797AC138}" dt="2023-11-11T19:51:44.237" v="528"/>
+        <pc:sldMkLst>
+          <pc:docMk/>
+          <pc:sldMk cId="3007205622" sldId="1439"/>
+        </pc:sldMkLst>
+      </pc:sldChg>
+      <pc:sldChg chg="modSp new mod">
+        <pc:chgData name="Lines, Todd" userId="afaf7c3a-e8aa-4568-882a-02ad8f9e19b0" providerId="ADAL" clId="{662FAC65-0189-436D-8148-A415797AC138}" dt="2023-11-11T19:35:31.898" v="520" actId="20577"/>
+        <pc:sldMkLst>
+          <pc:docMk/>
+          <pc:sldMk cId="743479051" sldId="1440"/>
+        </pc:sldMkLst>
+        <pc:spChg chg="mod">
+          <ac:chgData name="Lines, Todd" userId="afaf7c3a-e8aa-4568-882a-02ad8f9e19b0" providerId="ADAL" clId="{662FAC65-0189-436D-8148-A415797AC138}" dt="2023-11-11T19:32:13.694" v="13" actId="20577"/>
+          <ac:spMkLst>
+            <pc:docMk/>
+            <pc:sldMk cId="743479051" sldId="1440"/>
+            <ac:spMk id="2" creationId="{0551FCBA-E394-7DDD-C0D1-FB9205FFF3F3}"/>
+          </ac:spMkLst>
+        </pc:spChg>
+        <pc:spChg chg="mod">
+          <ac:chgData name="Lines, Todd" userId="afaf7c3a-e8aa-4568-882a-02ad8f9e19b0" providerId="ADAL" clId="{662FAC65-0189-436D-8148-A415797AC138}" dt="2023-11-11T19:35:31.898" v="520" actId="20577"/>
+          <ac:spMkLst>
+            <pc:docMk/>
+            <pc:sldMk cId="743479051" sldId="1440"/>
+            <ac:spMk id="3" creationId="{FC8EDCBA-3552-7B68-64F5-3692F67D4E06}"/>
+          </ac:spMkLst>
+        </pc:spChg>
+      </pc:sldChg>
+      <pc:sldChg chg="addSp delSp new mod">
+        <pc:chgData name="Lines, Todd" userId="afaf7c3a-e8aa-4568-882a-02ad8f9e19b0" providerId="ADAL" clId="{662FAC65-0189-436D-8148-A415797AC138}" dt="2023-11-14T17:32:50.951" v="535" actId="478"/>
+        <pc:sldMkLst>
+          <pc:docMk/>
+          <pc:sldMk cId="3770458863" sldId="1441"/>
+        </pc:sldMkLst>
+        <pc:spChg chg="del">
+          <ac:chgData name="Lines, Todd" userId="afaf7c3a-e8aa-4568-882a-02ad8f9e19b0" providerId="ADAL" clId="{662FAC65-0189-436D-8148-A415797AC138}" dt="2023-11-14T17:32:50.951" v="535" actId="478"/>
+          <ac:spMkLst>
+            <pc:docMk/>
+            <pc:sldMk cId="3770458863" sldId="1441"/>
+            <ac:spMk id="2" creationId="{FB604045-0913-C708-DC5B-C3540F7D1672}"/>
+          </ac:spMkLst>
+        </pc:spChg>
+        <pc:spChg chg="del">
+          <ac:chgData name="Lines, Todd" userId="afaf7c3a-e8aa-4568-882a-02ad8f9e19b0" providerId="ADAL" clId="{662FAC65-0189-436D-8148-A415797AC138}" dt="2023-11-14T17:32:46.904" v="534" actId="478"/>
+          <ac:spMkLst>
+            <pc:docMk/>
+            <pc:sldMk cId="3770458863" sldId="1441"/>
+            <ac:spMk id="3" creationId="{1CE1E0D7-54AD-9E16-562E-AB5DEE7F2564}"/>
+          </ac:spMkLst>
+        </pc:spChg>
+        <pc:picChg chg="add">
+          <ac:chgData name="Lines, Todd" userId="afaf7c3a-e8aa-4568-882a-02ad8f9e19b0" providerId="ADAL" clId="{662FAC65-0189-436D-8148-A415797AC138}" dt="2023-11-14T17:32:41.602" v="533" actId="22"/>
+          <ac:picMkLst>
+            <pc:docMk/>
+            <pc:sldMk cId="3770458863" sldId="1441"/>
+            <ac:picMk id="5" creationId="{6CF1B837-2C95-8F54-F938-A3C21FDE1393}"/>
+          </ac:picMkLst>
+        </pc:picChg>
+      </pc:sldChg>
+      <pc:sldChg chg="addSp new mod">
+        <pc:chgData name="Lines, Todd" userId="afaf7c3a-e8aa-4568-882a-02ad8f9e19b0" providerId="ADAL" clId="{662FAC65-0189-436D-8148-A415797AC138}" dt="2023-11-14T17:33:57.176" v="537" actId="22"/>
+        <pc:sldMkLst>
+          <pc:docMk/>
+          <pc:sldMk cId="3452187060" sldId="1442"/>
+        </pc:sldMkLst>
+        <pc:picChg chg="add">
+          <ac:chgData name="Lines, Todd" userId="afaf7c3a-e8aa-4568-882a-02ad8f9e19b0" providerId="ADAL" clId="{662FAC65-0189-436D-8148-A415797AC138}" dt="2023-11-14T17:33:57.176" v="537" actId="22"/>
+          <ac:picMkLst>
+            <pc:docMk/>
+            <pc:sldMk cId="3452187060" sldId="1442"/>
+            <ac:picMk id="5" creationId="{FA6FBA52-D007-A081-4D30-7B8228119B89}"/>
+          </ac:picMkLst>
+        </pc:picChg>
+      </pc:sldChg>
+      <pc:sldChg chg="addSp new mod">
+        <pc:chgData name="Lines, Todd" userId="afaf7c3a-e8aa-4568-882a-02ad8f9e19b0" providerId="ADAL" clId="{662FAC65-0189-436D-8148-A415797AC138}" dt="2023-11-14T17:34:08.727" v="539" actId="22"/>
+        <pc:sldMkLst>
+          <pc:docMk/>
+          <pc:sldMk cId="3828300500" sldId="1443"/>
+        </pc:sldMkLst>
+        <pc:picChg chg="add">
+          <ac:chgData name="Lines, Todd" userId="afaf7c3a-e8aa-4568-882a-02ad8f9e19b0" providerId="ADAL" clId="{662FAC65-0189-436D-8148-A415797AC138}" dt="2023-11-14T17:34:08.727" v="539" actId="22"/>
+          <ac:picMkLst>
+            <pc:docMk/>
+            <pc:sldMk cId="3828300500" sldId="1443"/>
+            <ac:picMk id="5" creationId="{605FCD64-3799-C8F4-15F5-6A6DA70545CA}"/>
+          </ac:picMkLst>
+        </pc:picChg>
+      </pc:sldChg>
+    </pc:docChg>
+  </pc:docChgLst>
+</pc:chgInfo>
+</file>
+
+<file path=ppt/notesMasters/notesMaster1.xml><?xml version="1.0" encoding="utf-8"?>
+<p:notesMaster xmlns:a="http://schemas.openxmlformats.org/drawingml/2006/main" xmlns:r="http://schemas.openxmlformats.org/officeDocument/2006/relationships" xmlns:p="http://schemas.openxmlformats.org/presentationml/2006/main">
+  <p:cSld>
+    <p:bg>
+      <p:bgRef idx="1001">
+        <a:schemeClr val="bg1"/>
+      </p:bgRef>
+    </p:bg>
+    <p:spTree>
+      <p:nvGrpSpPr>
+        <p:cNvPr id="1" name=""/>
+        <p:cNvGrpSpPr/>
+        <p:nvPr/>
+      </p:nvGrpSpPr>
+      <p:grpSpPr>
+        <a:xfrm>
+          <a:off x="0" y="0"/>
+          <a:ext cx="0" cy="0"/>
+          <a:chOff x="0" y="0"/>
+          <a:chExt cx="0" cy="0"/>
+        </a:xfrm>
+      </p:grpSpPr>
+      <p:sp>
+        <p:nvSpPr>
+          <p:cNvPr id="2" name="Header Placeholder 1"/>
+          <p:cNvSpPr>
+            <a:spLocks noGrp="1"/>
+          </p:cNvSpPr>
+          <p:nvPr>
+            <p:ph type="hdr" sz="quarter"/>
+          </p:nvPr>
+        </p:nvSpPr>
+        <p:spPr>
+          <a:xfrm>
+            <a:off x="0" y="0"/>
+            <a:ext cx="2971800" cy="458788"/>
+          </a:xfrm>
+          <a:prstGeom prst="rect">
+            <a:avLst/>
+          </a:prstGeom>
+        </p:spPr>
+        <p:txBody>
+          <a:bodyPr vert="horz" lIns="91440" tIns="45720" rIns="91440" bIns="45720" rtlCol="0"/>
+          <a:lstStyle>
+            <a:lvl1pPr algn="l">
+              <a:defRPr sz="1200"/>
+            </a:lvl1pPr>
+          </a:lstStyle>
+          <a:p>
+            <a:endParaRPr lang="en-US"/>
+          </a:p>
+        </p:txBody>
+      </p:sp>
+      <p:sp>
+        <p:nvSpPr>
+          <p:cNvPr id="3" name="Date Placeholder 2"/>
+          <p:cNvSpPr>
+            <a:spLocks noGrp="1"/>
+          </p:cNvSpPr>
+          <p:nvPr>
+            <p:ph type="dt" idx="1"/>
+          </p:nvPr>
+        </p:nvSpPr>
+        <p:spPr>
+          <a:xfrm>
+            <a:off x="3884613" y="0"/>
+            <a:ext cx="2971800" cy="458788"/>
+          </a:xfrm>
+          <a:prstGeom prst="rect">
+            <a:avLst/>
+          </a:prstGeom>
+        </p:spPr>
+        <p:txBody>
+          <a:bodyPr vert="horz" lIns="91440" tIns="45720" rIns="91440" bIns="45720" rtlCol="0"/>
+          <a:lstStyle>
+            <a:lvl1pPr algn="r">
+              <a:defRPr sz="1200"/>
+            </a:lvl1pPr>
+          </a:lstStyle>
+          <a:p>
+            <a:fld id="{723C16A9-9764-4C88-BFD5-BF9F569572D5}" type="datetimeFigureOut">
+              <a:rPr lang="en-US" smtClean="0"/>
+              <a:t>11/14/2023</a:t>
+            </a:fld>
+            <a:endParaRPr lang="en-US"/>
+          </a:p>
+        </p:txBody>
+      </p:sp>
+      <p:sp>
+        <p:nvSpPr>
+          <p:cNvPr id="4" name="Slide Image Placeholder 3"/>
+          <p:cNvSpPr>
+            <a:spLocks noGrp="1" noRot="1" noChangeAspect="1"/>
+          </p:cNvSpPr>
+          <p:nvPr>
+            <p:ph type="sldImg" idx="2"/>
+          </p:nvPr>
+        </p:nvSpPr>
+        <p:spPr>
+          <a:xfrm>
+            <a:off x="1371600" y="1143000"/>
+            <a:ext cx="4114800" cy="3086100"/>
+          </a:xfrm>
+          <a:prstGeom prst="rect">
+            <a:avLst/>
+          </a:prstGeom>
+          <a:noFill/>
+          <a:ln w="12700">
+            <a:solidFill>
+              <a:prstClr val="black"/>
+            </a:solidFill>
+          </a:ln>
+        </p:spPr>
+        <p:txBody>
+          <a:bodyPr vert="horz" lIns="91440" tIns="45720" rIns="91440" bIns="45720" rtlCol="0" anchor="ctr"/>
+          <a:lstStyle/>
+          <a:p>
+            <a:endParaRPr lang="en-US"/>
+          </a:p>
+        </p:txBody>
+      </p:sp>
+      <p:sp>
+        <p:nvSpPr>
+          <p:cNvPr id="5" name="Notes Placeholder 4"/>
+          <p:cNvSpPr>
+            <a:spLocks noGrp="1"/>
+          </p:cNvSpPr>
+          <p:nvPr>
+            <p:ph type="body" sz="quarter" idx="3"/>
+          </p:nvPr>
+        </p:nvSpPr>
+        <p:spPr>
+          <a:xfrm>
+            <a:off x="685800" y="4400550"/>
+            <a:ext cx="5486400" cy="3600450"/>
+          </a:xfrm>
+          <a:prstGeom prst="rect">
+            <a:avLst/>
+          </a:prstGeom>
+        </p:spPr>
+        <p:txBody>
+          <a:bodyPr vert="horz" lIns="91440" tIns="45720" rIns="91440" bIns="45720" rtlCol="0"/>
+          <a:lstStyle/>
+          <a:p>
+            <a:pPr lvl="0"/>
+            <a:r>
+              <a:rPr lang="en-US"/>
+              <a:t>Click to edit Master text styles</a:t>
+            </a:r>
+          </a:p>
+          <a:p>
+            <a:pPr lvl="1"/>
+            <a:r>
+              <a:rPr lang="en-US"/>
+              <a:t>Second level</a:t>
+            </a:r>
+          </a:p>
+          <a:p>
+            <a:pPr lvl="2"/>
+            <a:r>
+              <a:rPr lang="en-US"/>
+              <a:t>Third level</a:t>
+            </a:r>
+          </a:p>
+          <a:p>
+            <a:pPr lvl="3"/>
+            <a:r>
+              <a:rPr lang="en-US"/>
+              <a:t>Fourth level</a:t>
+            </a:r>
+          </a:p>
+          <a:p>
+            <a:pPr lvl="4"/>
+            <a:r>
+              <a:rPr lang="en-US"/>
+              <a:t>Fifth level</a:t>
+            </a:r>
+          </a:p>
+        </p:txBody>
+      </p:sp>
+      <p:sp>
+        <p:nvSpPr>
+          <p:cNvPr id="6" name="Footer Placeholder 5"/>
+          <p:cNvSpPr>
+            <a:spLocks noGrp="1"/>
+          </p:cNvSpPr>
+          <p:nvPr>
+            <p:ph type="ftr" sz="quarter" idx="4"/>
+          </p:nvPr>
+        </p:nvSpPr>
+        <p:spPr>
+          <a:xfrm>
+            <a:off x="0" y="8685213"/>
+            <a:ext cx="2971800" cy="458787"/>
+          </a:xfrm>
+          <a:prstGeom prst="rect">
+            <a:avLst/>
+          </a:prstGeom>
+        </p:spPr>
+        <p:txBody>
+          <a:bodyPr vert="horz" lIns="91440" tIns="45720" rIns="91440" bIns="45720" rtlCol="0" anchor="b"/>
+          <a:lstStyle>
+            <a:lvl1pPr algn="l">
+              <a:defRPr sz="1200"/>
+            </a:lvl1pPr>
+          </a:lstStyle>
+          <a:p>
+            <a:endParaRPr lang="en-US"/>
+          </a:p>
+        </p:txBody>
+      </p:sp>
+      <p:sp>
+        <p:nvSpPr>
+          <p:cNvPr id="7" name="Slide Number Placeholder 6"/>
+          <p:cNvSpPr>
+            <a:spLocks noGrp="1"/>
+          </p:cNvSpPr>
+          <p:nvPr>
+            <p:ph type="sldNum" sz="quarter" idx="5"/>
+          </p:nvPr>
+        </p:nvSpPr>
+        <p:spPr>
+          <a:xfrm>
+            <a:off x="3884613" y="8685213"/>
+            <a:ext cx="2971800" cy="458787"/>
+          </a:xfrm>
+          <a:prstGeom prst="rect">
+            <a:avLst/>
+          </a:prstGeom>
+        </p:spPr>
+        <p:txBody>
+          <a:bodyPr vert="horz" lIns="91440" tIns="45720" rIns="91440" bIns="45720" rtlCol="0" anchor="b"/>
+          <a:lstStyle>
+            <a:lvl1pPr algn="r">
+              <a:defRPr sz="1200"/>
+            </a:lvl1pPr>
+          </a:lstStyle>
+          <a:p>
+            <a:fld id="{F5B6B4B2-5F1E-4881-810A-9DB2EE1C939E}" type="slidenum">
+              <a:rPr lang="en-US" smtClean="0"/>
+              <a:t>‹#›</a:t>
+            </a:fld>
+            <a:endParaRPr lang="en-US"/>
+          </a:p>
+        </p:txBody>
+      </p:sp>
+    </p:spTree>
+    <p:extLst>
+      <p:ext uri="{BB962C8B-B14F-4D97-AF65-F5344CB8AC3E}">
+        <p14:creationId xmlns:p14="http://schemas.microsoft.com/office/powerpoint/2010/main" val="61999309"/>
+      </p:ext>
+    </p:extLst>
+  </p:cSld>
+  <p:clrMap bg1="lt1" tx1="dk1" bg2="lt2" tx2="dk2" accent1="accent1" accent2="accent2" accent3="accent3" accent4="accent4" accent5="accent5" accent6="accent6" hlink="hlink" folHlink="folHlink"/>
+  <p:notesStyle>
+    <a:lvl1pPr marL="0" algn="l" defTabSz="914400" rtl="0" eaLnBrk="1" latinLnBrk="0" hangingPunct="1">
+      <a:defRPr sz="1200" kern="1200">
+        <a:solidFill>
+          <a:schemeClr val="tx1"/>
+        </a:solidFill>
+        <a:latin typeface="+mn-lt"/>
+        <a:ea typeface="+mn-ea"/>
+        <a:cs typeface="+mn-cs"/>
+      </a:defRPr>
+    </a:lvl1pPr>
+    <a:lvl2pPr marL="457200" algn="l" defTabSz="914400" rtl="0" eaLnBrk="1" latinLnBrk="0" hangingPunct="1">
+      <a:defRPr sz="1200" kern="1200">
+        <a:solidFill>
+          <a:schemeClr val="tx1"/>
+        </a:solidFill>
+        <a:latin typeface="+mn-lt"/>
+        <a:ea typeface="+mn-ea"/>
+        <a:cs typeface="+mn-cs"/>
+      </a:defRPr>
+    </a:lvl2pPr>
+    <a:lvl3pPr marL="914400" algn="l" defTabSz="914400" rtl="0" eaLnBrk="1" latinLnBrk="0" hangingPunct="1">
+      <a:defRPr sz="1200" kern="1200">
+        <a:solidFill>
+          <a:schemeClr val="tx1"/>
+        </a:solidFill>
+        <a:latin typeface="+mn-lt"/>
+        <a:ea typeface="+mn-ea"/>
+        <a:cs typeface="+mn-cs"/>
+      </a:defRPr>
+    </a:lvl3pPr>
+    <a:lvl4pPr marL="1371600" algn="l" defTabSz="914400" rtl="0" eaLnBrk="1" latinLnBrk="0" hangingPunct="1">
+      <a:defRPr sz="1200" kern="1200">
+        <a:solidFill>
+          <a:schemeClr val="tx1"/>
+        </a:solidFill>
+        <a:latin typeface="+mn-lt"/>
+        <a:ea typeface="+mn-ea"/>
+        <a:cs typeface="+mn-cs"/>
+      </a:defRPr>
+    </a:lvl4pPr>
+    <a:lvl5pPr marL="1828800" algn="l" defTabSz="914400" rtl="0" eaLnBrk="1" latinLnBrk="0" hangingPunct="1">
+      <a:defRPr sz="1200" kern="1200">
+        <a:solidFill>
+          <a:schemeClr val="tx1"/>
+        </a:solidFill>
+        <a:latin typeface="+mn-lt"/>
+        <a:ea typeface="+mn-ea"/>
+        <a:cs typeface="+mn-cs"/>
+      </a:defRPr>
+    </a:lvl5pPr>
+    <a:lvl6pPr marL="2286000" algn="l" defTabSz="914400" rtl="0" eaLnBrk="1" latinLnBrk="0" hangingPunct="1">
+      <a:defRPr sz="1200" kern="1200">
+        <a:solidFill>
+          <a:schemeClr val="tx1"/>
+        </a:solidFill>
+        <a:latin typeface="+mn-lt"/>
+        <a:ea typeface="+mn-ea"/>
+        <a:cs typeface="+mn-cs"/>
+      </a:defRPr>
+    </a:lvl6pPr>
+    <a:lvl7pPr marL="2743200" algn="l" defTabSz="914400" rtl="0" eaLnBrk="1" latinLnBrk="0" hangingPunct="1">
+      <a:defRPr sz="1200" kern="1200">
+        <a:solidFill>
+          <a:schemeClr val="tx1"/>
+        </a:solidFill>
+        <a:latin typeface="+mn-lt"/>
+        <a:ea typeface="+mn-ea"/>
+        <a:cs typeface="+mn-cs"/>
+      </a:defRPr>
+    </a:lvl7pPr>
+    <a:lvl8pPr marL="3200400" algn="l" defTabSz="914400" rtl="0" eaLnBrk="1" latinLnBrk="0" hangingPunct="1">
+      <a:defRPr sz="1200" kern="1200">
+        <a:solidFill>
+          <a:schemeClr val="tx1"/>
+        </a:solidFill>
+        <a:latin typeface="+mn-lt"/>
+        <a:ea typeface="+mn-ea"/>
+        <a:cs typeface="+mn-cs"/>
+      </a:defRPr>
+    </a:lvl8pPr>
+    <a:lvl9pPr marL="3657600" algn="l" defTabSz="914400" rtl="0" eaLnBrk="1" latinLnBrk="0" hangingPunct="1">
+      <a:defRPr sz="1200" kern="1200">
+        <a:solidFill>
+          <a:schemeClr val="tx1"/>
+        </a:solidFill>
+        <a:latin typeface="+mn-lt"/>
+        <a:ea typeface="+mn-ea"/>
+        <a:cs typeface="+mn-cs"/>
+      </a:defRPr>
+    </a:lvl9pPr>
+  </p:notesStyle>
+</p:notesMaster>
+</file>
+
+<file path=ppt/notesSlides/notesSlide1.xml><?xml version="1.0" encoding="utf-8"?>
+<p:notes xmlns:a="http://schemas.openxmlformats.org/drawingml/2006/main" xmlns:r="http://schemas.openxmlformats.org/officeDocument/2006/relationships" xmlns:p="http://schemas.openxmlformats.org/presentationml/2006/main">
+  <p:cSld>
+    <p:spTree>
+      <p:nvGrpSpPr>
+        <p:cNvPr id="1" name=""/>
+        <p:cNvGrpSpPr/>
+        <p:nvPr/>
+      </p:nvGrpSpPr>
+      <p:grpSpPr>
+        <a:xfrm>
+          <a:off x="0" y="0"/>
+          <a:ext cx="0" cy="0"/>
+          <a:chOff x="0" y="0"/>
+          <a:chExt cx="0" cy="0"/>
+        </a:xfrm>
+      </p:grpSpPr>
+      <p:sp>
+        <p:nvSpPr>
+          <p:cNvPr id="7" name="Rectangle 5"/>
+          <p:cNvSpPr>
+            <a:spLocks noGrp="1" noChangeArrowheads="1"/>
+          </p:cNvSpPr>
+          <p:nvPr>
+            <p:ph type="sldNum" sz="quarter" idx="5"/>
+          </p:nvPr>
+        </p:nvSpPr>
+        <p:spPr>
+          <a:ln/>
+        </p:spPr>
+        <p:txBody>
+          <a:bodyPr/>
+          <a:lstStyle/>
+          <a:p>
+            <a:fld id="{8B37F1DC-EC92-4987-8D65-67E7641C3D1B}" type="slidenum">
+              <a:rPr lang="en-US"/>
+              <a:pPr/>
+              <a:t>14</a:t>
+            </a:fld>
+            <a:endParaRPr lang="en-US"/>
+          </a:p>
+        </p:txBody>
+      </p:sp>
+      <p:sp>
+        <p:nvSpPr>
+          <p:cNvPr id="1559554" name="Rectangle 2"/>
+          <p:cNvSpPr>
+            <a:spLocks noGrp="1" noRot="1" noChangeAspect="1" noChangeArrowheads="1" noTextEdit="1"/>
+          </p:cNvSpPr>
+          <p:nvPr>
+            <p:ph type="sldImg"/>
+          </p:nvPr>
+        </p:nvSpPr>
+        <p:spPr>
+          <a:ln/>
+        </p:spPr>
+      </p:sp>
+      <p:sp>
+        <p:nvSpPr>
+          <p:cNvPr id="1559555" name="Rectangle 3"/>
+          <p:cNvSpPr>
+            <a:spLocks noGrp="1" noChangeArrowheads="1"/>
+          </p:cNvSpPr>
+          <p:nvPr>
+            <p:ph type="body" idx="1"/>
+          </p:nvPr>
+        </p:nvSpPr>
+        <p:spPr/>
+        <p:txBody>
+          <a:bodyPr lIns="91432" tIns="45716" rIns="91432" bIns="45716"/>
+          <a:lstStyle/>
+          <a:p>
+            <a:endParaRPr lang="en-US"/>
+          </a:p>
+        </p:txBody>
+      </p:sp>
+    </p:spTree>
+  </p:cSld>
+  <p:clrMapOvr>
+    <a:masterClrMapping/>
+  </p:clrMapOvr>
+</p:notes>
+</file>
+
+<file path=ppt/notesSlides/notesSlide2.xml><?xml version="1.0" encoding="utf-8"?>
+<p:notes xmlns:a="http://schemas.openxmlformats.org/drawingml/2006/main" xmlns:r="http://schemas.openxmlformats.org/officeDocument/2006/relationships" xmlns:p="http://schemas.openxmlformats.org/presentationml/2006/main">
+  <p:cSld>
+    <p:spTree>
+      <p:nvGrpSpPr>
+        <p:cNvPr id="1" name=""/>
+        <p:cNvGrpSpPr/>
+        <p:nvPr/>
+      </p:nvGrpSpPr>
+      <p:grpSpPr>
+        <a:xfrm>
+          <a:off x="0" y="0"/>
+          <a:ext cx="0" cy="0"/>
+          <a:chOff x="0" y="0"/>
+          <a:chExt cx="0" cy="0"/>
+        </a:xfrm>
+      </p:grpSpPr>
+      <p:sp>
+        <p:nvSpPr>
+          <p:cNvPr id="7" name="Rectangle 5"/>
+          <p:cNvSpPr>
+            <a:spLocks noGrp="1" noChangeArrowheads="1"/>
+          </p:cNvSpPr>
+          <p:nvPr>
+            <p:ph type="sldNum" sz="quarter" idx="5"/>
+          </p:nvPr>
+        </p:nvSpPr>
+        <p:spPr>
+          <a:ln/>
+        </p:spPr>
+        <p:txBody>
+          <a:bodyPr/>
+          <a:lstStyle/>
+          <a:p>
+            <a:fld id="{27154766-43A5-46BB-B60F-A7FC2C0B5281}" type="slidenum">
+              <a:rPr lang="en-US"/>
+              <a:pPr/>
+              <a:t>15</a:t>
+            </a:fld>
+            <a:endParaRPr lang="en-US"/>
+          </a:p>
+        </p:txBody>
+      </p:sp>
+      <p:sp>
+        <p:nvSpPr>
+          <p:cNvPr id="1561602" name="Rectangle 2"/>
+          <p:cNvSpPr>
+            <a:spLocks noGrp="1" noRot="1" noChangeAspect="1" noChangeArrowheads="1" noTextEdit="1"/>
+          </p:cNvSpPr>
+          <p:nvPr>
+            <p:ph type="sldImg"/>
+          </p:nvPr>
+        </p:nvSpPr>
+        <p:spPr>
+          <a:ln/>
+        </p:spPr>
+      </p:sp>
+      <p:sp>
+        <p:nvSpPr>
+          <p:cNvPr id="1561603" name="Rectangle 3"/>
+          <p:cNvSpPr>
+            <a:spLocks noGrp="1" noChangeArrowheads="1"/>
+          </p:cNvSpPr>
+          <p:nvPr>
+            <p:ph type="body" idx="1"/>
+          </p:nvPr>
+        </p:nvSpPr>
+        <p:spPr/>
+        <p:txBody>
+          <a:bodyPr lIns="91432" tIns="45716" rIns="91432" bIns="45716"/>
+          <a:lstStyle/>
+          <a:p>
+            <a:endParaRPr lang="en-US"/>
+          </a:p>
+        </p:txBody>
+      </p:sp>
+    </p:spTree>
+  </p:cSld>
+  <p:clrMapOvr>
+    <a:masterClrMapping/>
+  </p:clrMapOvr>
+</p:notes>
 </file>
 
 <file path=ppt/slideLayouts/slideLayout1.xml><?xml version="1.0" encoding="utf-8"?>
@@ -151,10 +869,9 @@
           <a:lstStyle/>
           <a:p>
             <a:r>
-              <a:rPr lang="en-US" smtClean="0"/>
+              <a:rPr lang="en-US"/>
               <a:t>Click to edit Master title style</a:t>
             </a:r>
-            <a:endParaRPr lang="en-US"/>
           </a:p>
         </p:txBody>
       </p:sp>
@@ -270,10 +987,9 @@
           </a:lstStyle>
           <a:p>
             <a:r>
-              <a:rPr lang="en-US" smtClean="0"/>
+              <a:rPr lang="en-US"/>
               <a:t>Click to edit Master subtitle style</a:t>
             </a:r>
-            <a:endParaRPr lang="en-US"/>
           </a:p>
         </p:txBody>
       </p:sp>
@@ -295,7 +1011,7 @@
             <a:fld id="{C8567E70-1ED4-4006-ABA7-01DCC358FF45}" type="datetimeFigureOut">
               <a:rPr lang="en-US" smtClean="0"/>
               <a:pPr/>
-              <a:t>6/11/2014</a:t>
+              <a:t>11/14/2023</a:t>
             </a:fld>
             <a:endParaRPr lang="en-US"/>
           </a:p>
@@ -385,10 +1101,9 @@
           <a:lstStyle/>
           <a:p>
             <a:r>
-              <a:rPr lang="en-US" smtClean="0"/>
+              <a:rPr lang="en-US"/>
               <a:t>Click to edit Master title style</a:t>
             </a:r>
-            <a:endParaRPr lang="en-US"/>
           </a:p>
         </p:txBody>
       </p:sp>
@@ -409,38 +1124,37 @@
           <a:p>
             <a:pPr lvl="0"/>
             <a:r>
-              <a:rPr lang="en-US" smtClean="0"/>
+              <a:rPr lang="en-US"/>
               <a:t>Click to edit Master text styles</a:t>
             </a:r>
           </a:p>
           <a:p>
             <a:pPr lvl="1"/>
             <a:r>
-              <a:rPr lang="en-US" smtClean="0"/>
+              <a:rPr lang="en-US"/>
               <a:t>Second level</a:t>
             </a:r>
           </a:p>
           <a:p>
             <a:pPr lvl="2"/>
             <a:r>
-              <a:rPr lang="en-US" smtClean="0"/>
+              <a:rPr lang="en-US"/>
               <a:t>Third level</a:t>
             </a:r>
           </a:p>
           <a:p>
             <a:pPr lvl="3"/>
             <a:r>
-              <a:rPr lang="en-US" smtClean="0"/>
+              <a:rPr lang="en-US"/>
               <a:t>Fourth level</a:t>
             </a:r>
           </a:p>
           <a:p>
             <a:pPr lvl="4"/>
             <a:r>
-              <a:rPr lang="en-US" smtClean="0"/>
+              <a:rPr lang="en-US"/>
               <a:t>Fifth level</a:t>
             </a:r>
-            <a:endParaRPr lang="en-US"/>
           </a:p>
         </p:txBody>
       </p:sp>
@@ -462,7 +1176,7 @@
             <a:fld id="{C8567E70-1ED4-4006-ABA7-01DCC358FF45}" type="datetimeFigureOut">
               <a:rPr lang="en-US" smtClean="0"/>
               <a:pPr/>
-              <a:t>6/11/2014</a:t>
+              <a:t>11/14/2023</a:t>
             </a:fld>
             <a:endParaRPr lang="en-US"/>
           </a:p>
@@ -557,10 +1271,9 @@
           <a:lstStyle/>
           <a:p>
             <a:r>
-              <a:rPr lang="en-US" smtClean="0"/>
+              <a:rPr lang="en-US"/>
               <a:t>Click to edit Master title style</a:t>
             </a:r>
-            <a:endParaRPr lang="en-US"/>
           </a:p>
         </p:txBody>
       </p:sp>
@@ -586,38 +1299,37 @@
           <a:p>
             <a:pPr lvl="0"/>
             <a:r>
-              <a:rPr lang="en-US" smtClean="0"/>
+              <a:rPr lang="en-US"/>
               <a:t>Click to edit Master text styles</a:t>
             </a:r>
           </a:p>
           <a:p>
             <a:pPr lvl="1"/>
             <a:r>
-              <a:rPr lang="en-US" smtClean="0"/>
+              <a:rPr lang="en-US"/>
               <a:t>Second level</a:t>
             </a:r>
           </a:p>
           <a:p>
             <a:pPr lvl="2"/>
             <a:r>
-              <a:rPr lang="en-US" smtClean="0"/>
+              <a:rPr lang="en-US"/>
               <a:t>Third level</a:t>
             </a:r>
           </a:p>
           <a:p>
             <a:pPr lvl="3"/>
             <a:r>
-              <a:rPr lang="en-US" smtClean="0"/>
+              <a:rPr lang="en-US"/>
               <a:t>Fourth level</a:t>
             </a:r>
           </a:p>
           <a:p>
             <a:pPr lvl="4"/>
             <a:r>
-              <a:rPr lang="en-US" smtClean="0"/>
+              <a:rPr lang="en-US"/>
               <a:t>Fifth level</a:t>
             </a:r>
-            <a:endParaRPr lang="en-US"/>
           </a:p>
         </p:txBody>
       </p:sp>
@@ -639,7 +1351,7 @@
             <a:fld id="{C8567E70-1ED4-4006-ABA7-01DCC358FF45}" type="datetimeFigureOut">
               <a:rPr lang="en-US" smtClean="0"/>
               <a:pPr/>
-              <a:t>6/11/2014</a:t>
+              <a:t>11/14/2023</a:t>
             </a:fld>
             <a:endParaRPr lang="en-US"/>
           </a:p>
@@ -729,10 +1441,9 @@
           <a:lstStyle/>
           <a:p>
             <a:r>
-              <a:rPr lang="en-US" smtClean="0"/>
+              <a:rPr lang="en-US"/>
               <a:t>Click to edit Master title style</a:t>
             </a:r>
-            <a:endParaRPr lang="en-US"/>
           </a:p>
         </p:txBody>
       </p:sp>
@@ -753,38 +1464,37 @@
           <a:p>
             <a:pPr lvl="0"/>
             <a:r>
-              <a:rPr lang="en-US" smtClean="0"/>
+              <a:rPr lang="en-US"/>
               <a:t>Click to edit Master text styles</a:t>
             </a:r>
           </a:p>
           <a:p>
             <a:pPr lvl="1"/>
             <a:r>
-              <a:rPr lang="en-US" smtClean="0"/>
+              <a:rPr lang="en-US"/>
               <a:t>Second level</a:t>
             </a:r>
           </a:p>
           <a:p>
             <a:pPr lvl="2"/>
             <a:r>
-              <a:rPr lang="en-US" smtClean="0"/>
+              <a:rPr lang="en-US"/>
               <a:t>Third level</a:t>
             </a:r>
           </a:p>
           <a:p>
             <a:pPr lvl="3"/>
             <a:r>
-              <a:rPr lang="en-US" smtClean="0"/>
+              <a:rPr lang="en-US"/>
               <a:t>Fourth level</a:t>
             </a:r>
           </a:p>
           <a:p>
             <a:pPr lvl="4"/>
             <a:r>
-              <a:rPr lang="en-US" smtClean="0"/>
+              <a:rPr lang="en-US"/>
               <a:t>Fifth level</a:t>
             </a:r>
-            <a:endParaRPr lang="en-US"/>
           </a:p>
         </p:txBody>
       </p:sp>
@@ -806,7 +1516,7 @@
             <a:fld id="{C8567E70-1ED4-4006-ABA7-01DCC358FF45}" type="datetimeFigureOut">
               <a:rPr lang="en-US" smtClean="0"/>
               <a:pPr/>
-              <a:t>6/11/2014</a:t>
+              <a:t>11/14/2023</a:t>
             </a:fld>
             <a:endParaRPr lang="en-US"/>
           </a:p>
@@ -905,10 +1615,9 @@
           </a:lstStyle>
           <a:p>
             <a:r>
-              <a:rPr lang="en-US" smtClean="0"/>
+              <a:rPr lang="en-US"/>
               <a:t>Click to edit Master title style</a:t>
             </a:r>
-            <a:endParaRPr lang="en-US"/>
           </a:p>
         </p:txBody>
       </p:sp>
@@ -1025,7 +1734,7 @@
           <a:p>
             <a:pPr lvl="0"/>
             <a:r>
-              <a:rPr lang="en-US" smtClean="0"/>
+              <a:rPr lang="en-US"/>
               <a:t>Click to edit Master text styles</a:t>
             </a:r>
           </a:p>
@@ -1049,7 +1758,7 @@
             <a:fld id="{C8567E70-1ED4-4006-ABA7-01DCC358FF45}" type="datetimeFigureOut">
               <a:rPr lang="en-US" smtClean="0"/>
               <a:pPr/>
-              <a:t>6/11/2014</a:t>
+              <a:t>11/14/2023</a:t>
             </a:fld>
             <a:endParaRPr lang="en-US"/>
           </a:p>
@@ -1139,10 +1848,9 @@
           <a:lstStyle/>
           <a:p>
             <a:r>
-              <a:rPr lang="en-US" smtClean="0"/>
+              <a:rPr lang="en-US"/>
               <a:t>Click to edit Master title style</a:t>
             </a:r>
-            <a:endParaRPr lang="en-US"/>
           </a:p>
         </p:txBody>
       </p:sp>
@@ -1196,38 +1904,37 @@
           <a:p>
             <a:pPr lvl="0"/>
             <a:r>
-              <a:rPr lang="en-US" smtClean="0"/>
+              <a:rPr lang="en-US"/>
               <a:t>Click to edit Master text styles</a:t>
             </a:r>
           </a:p>
           <a:p>
             <a:pPr lvl="1"/>
             <a:r>
-              <a:rPr lang="en-US" smtClean="0"/>
+              <a:rPr lang="en-US"/>
               <a:t>Second level</a:t>
             </a:r>
           </a:p>
           <a:p>
             <a:pPr lvl="2"/>
             <a:r>
-              <a:rPr lang="en-US" smtClean="0"/>
+              <a:rPr lang="en-US"/>
               <a:t>Third level</a:t>
             </a:r>
           </a:p>
           <a:p>
             <a:pPr lvl="3"/>
             <a:r>
-              <a:rPr lang="en-US" smtClean="0"/>
+              <a:rPr lang="en-US"/>
               <a:t>Fourth level</a:t>
             </a:r>
           </a:p>
           <a:p>
             <a:pPr lvl="4"/>
             <a:r>
-              <a:rPr lang="en-US" smtClean="0"/>
+              <a:rPr lang="en-US"/>
               <a:t>Fifth level</a:t>
             </a:r>
-            <a:endParaRPr lang="en-US"/>
           </a:p>
         </p:txBody>
       </p:sp>
@@ -1281,38 +1988,37 @@
           <a:p>
             <a:pPr lvl="0"/>
             <a:r>
-              <a:rPr lang="en-US" smtClean="0"/>
+              <a:rPr lang="en-US"/>
               <a:t>Click to edit Master text styles</a:t>
             </a:r>
           </a:p>
           <a:p>
             <a:pPr lvl="1"/>
             <a:r>
-              <a:rPr lang="en-US" smtClean="0"/>
+              <a:rPr lang="en-US"/>
               <a:t>Second level</a:t>
             </a:r>
           </a:p>
           <a:p>
             <a:pPr lvl="2"/>
             <a:r>
-              <a:rPr lang="en-US" smtClean="0"/>
+              <a:rPr lang="en-US"/>
               <a:t>Third level</a:t>
             </a:r>
           </a:p>
           <a:p>
             <a:pPr lvl="3"/>
             <a:r>
-              <a:rPr lang="en-US" smtClean="0"/>
+              <a:rPr lang="en-US"/>
               <a:t>Fourth level</a:t>
             </a:r>
           </a:p>
           <a:p>
             <a:pPr lvl="4"/>
             <a:r>
-              <a:rPr lang="en-US" smtClean="0"/>
+              <a:rPr lang="en-US"/>
               <a:t>Fifth level</a:t>
             </a:r>
-            <a:endParaRPr lang="en-US"/>
           </a:p>
         </p:txBody>
       </p:sp>
@@ -1334,7 +2040,7 @@
             <a:fld id="{C8567E70-1ED4-4006-ABA7-01DCC358FF45}" type="datetimeFigureOut">
               <a:rPr lang="en-US" smtClean="0"/>
               <a:pPr/>
-              <a:t>6/11/2014</a:t>
+              <a:t>11/14/2023</a:t>
             </a:fld>
             <a:endParaRPr lang="en-US"/>
           </a:p>
@@ -1428,10 +2134,9 @@
           </a:lstStyle>
           <a:p>
             <a:r>
-              <a:rPr lang="en-US" smtClean="0"/>
+              <a:rPr lang="en-US"/>
               <a:t>Click to edit Master title style</a:t>
             </a:r>
-            <a:endParaRPr lang="en-US"/>
           </a:p>
         </p:txBody>
       </p:sp>
@@ -1494,7 +2199,7 @@
           <a:p>
             <a:pPr lvl="0"/>
             <a:r>
-              <a:rPr lang="en-US" smtClean="0"/>
+              <a:rPr lang="en-US"/>
               <a:t>Click to edit Master text styles</a:t>
             </a:r>
           </a:p>
@@ -1550,38 +2255,37 @@
           <a:p>
             <a:pPr lvl="0"/>
             <a:r>
-              <a:rPr lang="en-US" smtClean="0"/>
+              <a:rPr lang="en-US"/>
               <a:t>Click to edit Master text styles</a:t>
             </a:r>
           </a:p>
           <a:p>
             <a:pPr lvl="1"/>
             <a:r>
-              <a:rPr lang="en-US" smtClean="0"/>
+              <a:rPr lang="en-US"/>
               <a:t>Second level</a:t>
             </a:r>
           </a:p>
           <a:p>
             <a:pPr lvl="2"/>
             <a:r>
-              <a:rPr lang="en-US" smtClean="0"/>
+              <a:rPr lang="en-US"/>
               <a:t>Third level</a:t>
             </a:r>
           </a:p>
           <a:p>
             <a:pPr lvl="3"/>
             <a:r>
-              <a:rPr lang="en-US" smtClean="0"/>
+              <a:rPr lang="en-US"/>
               <a:t>Fourth level</a:t>
             </a:r>
           </a:p>
           <a:p>
             <a:pPr lvl="4"/>
             <a:r>
-              <a:rPr lang="en-US" smtClean="0"/>
+              <a:rPr lang="en-US"/>
               <a:t>Fifth level</a:t>
             </a:r>
-            <a:endParaRPr lang="en-US"/>
           </a:p>
         </p:txBody>
       </p:sp>
@@ -1644,7 +2348,7 @@
           <a:p>
             <a:pPr lvl="0"/>
             <a:r>
-              <a:rPr lang="en-US" smtClean="0"/>
+              <a:rPr lang="en-US"/>
               <a:t>Click to edit Master text styles</a:t>
             </a:r>
           </a:p>
@@ -1700,38 +2404,37 @@
           <a:p>
             <a:pPr lvl="0"/>
             <a:r>
-              <a:rPr lang="en-US" smtClean="0"/>
+              <a:rPr lang="en-US"/>
               <a:t>Click to edit Master text styles</a:t>
             </a:r>
           </a:p>
           <a:p>
             <a:pPr lvl="1"/>
             <a:r>
-              <a:rPr lang="en-US" smtClean="0"/>
+              <a:rPr lang="en-US"/>
               <a:t>Second level</a:t>
             </a:r>
           </a:p>
           <a:p>
             <a:pPr lvl="2"/>
             <a:r>
-              <a:rPr lang="en-US" smtClean="0"/>
+              <a:rPr lang="en-US"/>
               <a:t>Third level</a:t>
             </a:r>
           </a:p>
           <a:p>
             <a:pPr lvl="3"/>
             <a:r>
-              <a:rPr lang="en-US" smtClean="0"/>
+              <a:rPr lang="en-US"/>
               <a:t>Fourth level</a:t>
             </a:r>
           </a:p>
           <a:p>
             <a:pPr lvl="4"/>
             <a:r>
-              <a:rPr lang="en-US" smtClean="0"/>
+              <a:rPr lang="en-US"/>
               <a:t>Fifth level</a:t>
             </a:r>
-            <a:endParaRPr lang="en-US"/>
           </a:p>
         </p:txBody>
       </p:sp>
@@ -1753,7 +2456,7 @@
             <a:fld id="{C8567E70-1ED4-4006-ABA7-01DCC358FF45}" type="datetimeFigureOut">
               <a:rPr lang="en-US" smtClean="0"/>
               <a:pPr/>
-              <a:t>6/11/2014</a:t>
+              <a:t>11/14/2023</a:t>
             </a:fld>
             <a:endParaRPr lang="en-US"/>
           </a:p>
@@ -1843,10 +2546,9 @@
           <a:lstStyle/>
           <a:p>
             <a:r>
-              <a:rPr lang="en-US" smtClean="0"/>
+              <a:rPr lang="en-US"/>
               <a:t>Click to edit Master title style</a:t>
             </a:r>
-            <a:endParaRPr lang="en-US"/>
           </a:p>
         </p:txBody>
       </p:sp>
@@ -1868,7 +2570,7 @@
             <a:fld id="{C8567E70-1ED4-4006-ABA7-01DCC358FF45}" type="datetimeFigureOut">
               <a:rPr lang="en-US" smtClean="0"/>
               <a:pPr/>
-              <a:t>6/11/2014</a:t>
+              <a:t>11/14/2023</a:t>
             </a:fld>
             <a:endParaRPr lang="en-US"/>
           </a:p>
@@ -1960,7 +2662,7 @@
             <a:fld id="{C8567E70-1ED4-4006-ABA7-01DCC358FF45}" type="datetimeFigureOut">
               <a:rPr lang="en-US" smtClean="0"/>
               <a:pPr/>
-              <a:t>6/11/2014</a:t>
+              <a:t>11/14/2023</a:t>
             </a:fld>
             <a:endParaRPr lang="en-US"/>
           </a:p>
@@ -2059,10 +2761,9 @@
           </a:lstStyle>
           <a:p>
             <a:r>
-              <a:rPr lang="en-US" smtClean="0"/>
+              <a:rPr lang="en-US"/>
               <a:t>Click to edit Master title style</a:t>
             </a:r>
-            <a:endParaRPr lang="en-US"/>
           </a:p>
         </p:txBody>
       </p:sp>
@@ -2116,38 +2817,37 @@
           <a:p>
             <a:pPr lvl="0"/>
             <a:r>
-              <a:rPr lang="en-US" smtClean="0"/>
+              <a:rPr lang="en-US"/>
               <a:t>Click to edit Master text styles</a:t>
             </a:r>
           </a:p>
           <a:p>
             <a:pPr lvl="1"/>
             <a:r>
-              <a:rPr lang="en-US" smtClean="0"/>
+              <a:rPr lang="en-US"/>
               <a:t>Second level</a:t>
             </a:r>
           </a:p>
           <a:p>
             <a:pPr lvl="2"/>
             <a:r>
-              <a:rPr lang="en-US" smtClean="0"/>
+              <a:rPr lang="en-US"/>
               <a:t>Third level</a:t>
             </a:r>
           </a:p>
           <a:p>
             <a:pPr lvl="3"/>
             <a:r>
-              <a:rPr lang="en-US" smtClean="0"/>
+              <a:rPr lang="en-US"/>
               <a:t>Fourth level</a:t>
             </a:r>
           </a:p>
           <a:p>
             <a:pPr lvl="4"/>
             <a:r>
-              <a:rPr lang="en-US" smtClean="0"/>
+              <a:rPr lang="en-US"/>
               <a:t>Fifth level</a:t>
             </a:r>
-            <a:endParaRPr lang="en-US"/>
           </a:p>
         </p:txBody>
       </p:sp>
@@ -2210,7 +2910,7 @@
           <a:p>
             <a:pPr lvl="0"/>
             <a:r>
-              <a:rPr lang="en-US" smtClean="0"/>
+              <a:rPr lang="en-US"/>
               <a:t>Click to edit Master text styles</a:t>
             </a:r>
           </a:p>
@@ -2234,7 +2934,7 @@
             <a:fld id="{C8567E70-1ED4-4006-ABA7-01DCC358FF45}" type="datetimeFigureOut">
               <a:rPr lang="en-US" smtClean="0"/>
               <a:pPr/>
-              <a:t>6/11/2014</a:t>
+              <a:t>11/14/2023</a:t>
             </a:fld>
             <a:endParaRPr lang="en-US"/>
           </a:p>
@@ -2333,10 +3033,9 @@
           </a:lstStyle>
           <a:p>
             <a:r>
-              <a:rPr lang="en-US" smtClean="0"/>
+              <a:rPr lang="en-US"/>
               <a:t>Click to edit Master title style</a:t>
             </a:r>
-            <a:endParaRPr lang="en-US"/>
           </a:p>
         </p:txBody>
       </p:sp>
@@ -2460,7 +3159,7 @@
           <a:p>
             <a:pPr lvl="0"/>
             <a:r>
-              <a:rPr lang="en-US" smtClean="0"/>
+              <a:rPr lang="en-US"/>
               <a:t>Click to edit Master text styles</a:t>
             </a:r>
           </a:p>
@@ -2484,7 +3183,7 @@
             <a:fld id="{C8567E70-1ED4-4006-ABA7-01DCC358FF45}" type="datetimeFigureOut">
               <a:rPr lang="en-US" smtClean="0"/>
               <a:pPr/>
-              <a:t>6/11/2014</a:t>
+              <a:t>11/14/2023</a:t>
             </a:fld>
             <a:endParaRPr lang="en-US"/>
           </a:p>
@@ -2589,10 +3288,9 @@
           <a:lstStyle/>
           <a:p>
             <a:r>
-              <a:rPr lang="en-US" smtClean="0"/>
+              <a:rPr lang="en-US"/>
               <a:t>Click to edit Master title style</a:t>
             </a:r>
-            <a:endParaRPr lang="en-US"/>
           </a:p>
         </p:txBody>
       </p:sp>
@@ -2623,38 +3321,37 @@
           <a:p>
             <a:pPr lvl="0"/>
             <a:r>
-              <a:rPr lang="en-US" smtClean="0"/>
+              <a:rPr lang="en-US"/>
               <a:t>Click to edit Master text styles</a:t>
             </a:r>
           </a:p>
           <a:p>
             <a:pPr lvl="1"/>
             <a:r>
-              <a:rPr lang="en-US" smtClean="0"/>
+              <a:rPr lang="en-US"/>
               <a:t>Second level</a:t>
             </a:r>
           </a:p>
           <a:p>
             <a:pPr lvl="2"/>
             <a:r>
-              <a:rPr lang="en-US" smtClean="0"/>
+              <a:rPr lang="en-US"/>
               <a:t>Third level</a:t>
             </a:r>
           </a:p>
           <a:p>
             <a:pPr lvl="3"/>
             <a:r>
-              <a:rPr lang="en-US" smtClean="0"/>
+              <a:rPr lang="en-US"/>
               <a:t>Fourth level</a:t>
             </a:r>
           </a:p>
           <a:p>
             <a:pPr lvl="4"/>
             <a:r>
-              <a:rPr lang="en-US" smtClean="0"/>
+              <a:rPr lang="en-US"/>
               <a:t>Fifth level</a:t>
             </a:r>
-            <a:endParaRPr lang="en-US"/>
           </a:p>
         </p:txBody>
       </p:sp>
@@ -2694,7 +3391,7 @@
             <a:fld id="{C8567E70-1ED4-4006-ABA7-01DCC358FF45}" type="datetimeFigureOut">
               <a:rPr lang="en-US" smtClean="0"/>
               <a:pPr/>
-              <a:t>6/11/2014</a:t>
+              <a:t>11/14/2023</a:t>
             </a:fld>
             <a:endParaRPr lang="en-US"/>
           </a:p>
@@ -3065,6 +3762,2270 @@
           <a:chExt cx="0" cy="0"/>
         </a:xfrm>
       </p:grpSpPr>
+      <p:sp>
+        <p:nvSpPr>
+          <p:cNvPr id="2" name="Title 1"/>
+          <p:cNvSpPr>
+            <a:spLocks noGrp="1"/>
+          </p:cNvSpPr>
+          <p:nvPr>
+            <p:ph type="title"/>
+          </p:nvPr>
+        </p:nvSpPr>
+        <p:spPr/>
+        <p:txBody>
+          <a:bodyPr/>
+          <a:lstStyle/>
+          <a:p>
+            <a:r>
+              <a:rPr lang="en-US" dirty="0"/>
+              <a:t>Question 223.37.1</a:t>
+            </a:r>
+          </a:p>
+        </p:txBody>
+      </p:sp>
+      <p:sp>
+        <p:nvSpPr>
+          <p:cNvPr id="3" name="Content Placeholder 2"/>
+          <p:cNvSpPr>
+            <a:spLocks noGrp="1"/>
+          </p:cNvSpPr>
+          <p:nvPr>
+            <p:ph idx="1"/>
+          </p:nvPr>
+        </p:nvSpPr>
+        <p:spPr/>
+        <p:txBody>
+          <a:bodyPr/>
+          <a:lstStyle/>
+          <a:p>
+            <a:pPr>
+              <a:buNone/>
+            </a:pPr>
+            <a:r>
+              <a:rPr lang="en-US" dirty="0"/>
+              <a:t>Suppose we have a biological system that uses sodium ions (+1q</a:t>
+            </a:r>
+            <a:r>
+              <a:rPr lang="en-US" baseline="-25000" dirty="0"/>
+              <a:t>e</a:t>
+            </a:r>
+            <a:r>
+              <a:rPr lang="en-US" dirty="0"/>
+              <a:t>) in which we have a current density, J. If we could get the organism to switch to Calcium ions (+2q</a:t>
+            </a:r>
+            <a:r>
+              <a:rPr lang="en-US" baseline="-25000" dirty="0"/>
+              <a:t>e</a:t>
+            </a:r>
+            <a:r>
+              <a:rPr lang="en-US" dirty="0"/>
+              <a:t>), the current density would</a:t>
+            </a:r>
+          </a:p>
+          <a:p>
+            <a:pPr marL="514350" indent="-514350">
+              <a:buAutoNum type="alphaLcParenR"/>
+            </a:pPr>
+            <a:r>
+              <a:rPr lang="en-US" dirty="0"/>
+              <a:t>Increase</a:t>
+            </a:r>
+          </a:p>
+          <a:p>
+            <a:pPr marL="514350" indent="-514350">
+              <a:buAutoNum type="alphaLcParenR"/>
+            </a:pPr>
+            <a:r>
+              <a:rPr lang="en-US" dirty="0"/>
+              <a:t> decrease </a:t>
+            </a:r>
+          </a:p>
+          <a:p>
+            <a:pPr marL="514350" indent="-514350">
+              <a:buAutoNum type="alphaLcParenR"/>
+            </a:pPr>
+            <a:r>
+              <a:rPr lang="en-US" dirty="0"/>
+              <a:t>stay the same?</a:t>
+            </a:r>
+          </a:p>
+        </p:txBody>
+      </p:sp>
+      <p:sp>
+        <p:nvSpPr>
+          <p:cNvPr id="4" name="Slide Number Placeholder 3"/>
+          <p:cNvSpPr>
+            <a:spLocks noGrp="1"/>
+          </p:cNvSpPr>
+          <p:nvPr>
+            <p:ph type="sldNum" sz="quarter" idx="12"/>
+          </p:nvPr>
+        </p:nvSpPr>
+        <p:spPr/>
+        <p:txBody>
+          <a:bodyPr/>
+          <a:lstStyle/>
+          <a:p>
+            <a:pPr>
+              <a:defRPr/>
+            </a:pPr>
+            <a:fld id="{64137B81-8888-4253-92EC-0AED2A590749}" type="slidenum">
+              <a:rPr lang="en-US" smtClean="0"/>
+              <a:pPr>
+                <a:defRPr/>
+              </a:pPr>
+              <a:t>1</a:t>
+            </a:fld>
+            <a:endParaRPr lang="en-US"/>
+          </a:p>
+        </p:txBody>
+      </p:sp>
+    </p:spTree>
+  </p:cSld>
+  <p:clrMapOvr>
+    <a:masterClrMapping/>
+  </p:clrMapOvr>
+</p:sld>
+</file>
+
+<file path=ppt/slides/slide10.xml><?xml version="1.0" encoding="utf-8"?>
+<p:sld xmlns:a="http://schemas.openxmlformats.org/drawingml/2006/main" xmlns:r="http://schemas.openxmlformats.org/officeDocument/2006/relationships" xmlns:p="http://schemas.openxmlformats.org/presentationml/2006/main">
+  <p:cSld>
+    <p:spTree>
+      <p:nvGrpSpPr>
+        <p:cNvPr id="1" name=""/>
+        <p:cNvGrpSpPr/>
+        <p:nvPr/>
+      </p:nvGrpSpPr>
+      <p:grpSpPr>
+        <a:xfrm>
+          <a:off x="0" y="0"/>
+          <a:ext cx="0" cy="0"/>
+          <a:chOff x="0" y="0"/>
+          <a:chExt cx="0" cy="0"/>
+        </a:xfrm>
+      </p:grpSpPr>
+      <p:sp>
+        <p:nvSpPr>
+          <p:cNvPr id="2" name="Title 1"/>
+          <p:cNvSpPr>
+            <a:spLocks noGrp="1"/>
+          </p:cNvSpPr>
+          <p:nvPr>
+            <p:ph type="title"/>
+          </p:nvPr>
+        </p:nvSpPr>
+        <p:spPr/>
+        <p:txBody>
+          <a:bodyPr/>
+          <a:lstStyle/>
+          <a:p>
+            <a:r>
+              <a:rPr lang="en-US" dirty="0"/>
+              <a:t>Question 223.37.4.5</a:t>
+            </a:r>
+          </a:p>
+        </p:txBody>
+      </p:sp>
+      <p:sp>
+        <p:nvSpPr>
+          <p:cNvPr id="3" name="Content Placeholder 2"/>
+          <p:cNvSpPr>
+            <a:spLocks noGrp="1"/>
+          </p:cNvSpPr>
+          <p:nvPr>
+            <p:ph idx="1"/>
+          </p:nvPr>
+        </p:nvSpPr>
+        <p:spPr/>
+        <p:txBody>
+          <a:bodyPr>
+            <a:normAutofit fontScale="85000" lnSpcReduction="10000"/>
+          </a:bodyPr>
+          <a:lstStyle/>
+          <a:p>
+            <a:pPr marL="0" indent="0">
+              <a:buNone/>
+            </a:pPr>
+            <a:r>
+              <a:rPr lang="en-US" dirty="0"/>
+              <a:t>You start your care in the winter. Since it is dark outside you turned on your lights before you tried to start the car. You notice that when the starter motor turns, the lights dim. Why?</a:t>
+            </a:r>
+          </a:p>
+          <a:p>
+            <a:pPr marL="514350" indent="-514350">
+              <a:buAutoNum type="alphaLcParenR"/>
+            </a:pPr>
+            <a:r>
+              <a:rPr lang="en-US" dirty="0"/>
+              <a:t>The battery can’t supply enough current so you are running out with both the lights and the starter motor working.</a:t>
+            </a:r>
+          </a:p>
+          <a:p>
+            <a:pPr marL="514350" indent="-514350">
+              <a:buAutoNum type="alphaLcParenR"/>
+            </a:pPr>
+            <a:r>
+              <a:rPr lang="en-US" dirty="0"/>
+              <a:t>Your battery is damaged by freezing.</a:t>
+            </a:r>
+          </a:p>
+          <a:p>
+            <a:pPr marL="514350" indent="-514350">
+              <a:buAutoNum type="alphaLcParenR"/>
+            </a:pPr>
+            <a:r>
+              <a:rPr lang="en-US" dirty="0"/>
+              <a:t>Because of the internal resistance in the battery, the voltage supplied has dropped below 12 volts.</a:t>
+            </a:r>
+          </a:p>
+          <a:p>
+            <a:pPr marL="514350" indent="-514350">
+              <a:buAutoNum type="alphaLcParenR"/>
+            </a:pPr>
+            <a:r>
+              <a:rPr lang="en-US" dirty="0" err="1"/>
+              <a:t>Alians</a:t>
+            </a:r>
+            <a:endParaRPr lang="en-US" dirty="0"/>
+          </a:p>
+        </p:txBody>
+      </p:sp>
+      <p:sp>
+        <p:nvSpPr>
+          <p:cNvPr id="4" name="Slide Number Placeholder 3"/>
+          <p:cNvSpPr>
+            <a:spLocks noGrp="1"/>
+          </p:cNvSpPr>
+          <p:nvPr>
+            <p:ph type="sldNum" sz="quarter" idx="12"/>
+          </p:nvPr>
+        </p:nvSpPr>
+        <p:spPr/>
+        <p:txBody>
+          <a:bodyPr/>
+          <a:lstStyle/>
+          <a:p>
+            <a:pPr>
+              <a:defRPr/>
+            </a:pPr>
+            <a:fld id="{64137B81-8888-4253-92EC-0AED2A590749}" type="slidenum">
+              <a:rPr lang="en-US" smtClean="0"/>
+              <a:pPr>
+                <a:defRPr/>
+              </a:pPr>
+              <a:t>10</a:t>
+            </a:fld>
+            <a:endParaRPr lang="en-US"/>
+          </a:p>
+        </p:txBody>
+      </p:sp>
+    </p:spTree>
+    <p:extLst>
+      <p:ext uri="{BB962C8B-B14F-4D97-AF65-F5344CB8AC3E}">
+        <p14:creationId xmlns:p14="http://schemas.microsoft.com/office/powerpoint/2010/main" val="3007205622"/>
+      </p:ext>
+    </p:extLst>
+  </p:cSld>
+  <p:clrMapOvr>
+    <a:masterClrMapping/>
+  </p:clrMapOvr>
+</p:sld>
+</file>
+
+<file path=ppt/slides/slide11.xml><?xml version="1.0" encoding="utf-8"?>
+<p:sld xmlns:a="http://schemas.openxmlformats.org/drawingml/2006/main" xmlns:r="http://schemas.openxmlformats.org/officeDocument/2006/relationships" xmlns:p="http://schemas.openxmlformats.org/presentationml/2006/main">
+  <p:cSld>
+    <p:spTree>
+      <p:nvGrpSpPr>
+        <p:cNvPr id="1" name=""/>
+        <p:cNvGrpSpPr/>
+        <p:nvPr/>
+      </p:nvGrpSpPr>
+      <p:grpSpPr>
+        <a:xfrm>
+          <a:off x="0" y="0"/>
+          <a:ext cx="0" cy="0"/>
+          <a:chOff x="0" y="0"/>
+          <a:chExt cx="0" cy="0"/>
+        </a:xfrm>
+      </p:grpSpPr>
+      <p:pic>
+        <p:nvPicPr>
+          <p:cNvPr id="3074" name="Picture 2"/>
+          <p:cNvPicPr>
+            <a:picLocks noChangeAspect="1" noChangeArrowheads="1"/>
+          </p:cNvPicPr>
+          <p:nvPr/>
+        </p:nvPicPr>
+        <p:blipFill>
+          <a:blip r:embed="rId2" cstate="print"/>
+          <a:srcRect/>
+          <a:stretch>
+            <a:fillRect/>
+          </a:stretch>
+        </p:blipFill>
+        <p:spPr bwMode="auto">
+          <a:xfrm>
+            <a:off x="1143000" y="456288"/>
+            <a:ext cx="6720839" cy="5827861"/>
+          </a:xfrm>
+          <a:prstGeom prst="rect">
+            <a:avLst/>
+          </a:prstGeom>
+          <a:noFill/>
+          <a:ln w="9525">
+            <a:noFill/>
+            <a:miter lim="800000"/>
+            <a:headEnd/>
+            <a:tailEnd/>
+          </a:ln>
+          <a:effectLst/>
+        </p:spPr>
+      </p:pic>
+    </p:spTree>
+  </p:cSld>
+  <p:clrMapOvr>
+    <a:masterClrMapping/>
+  </p:clrMapOvr>
+</p:sld>
+</file>
+
+<file path=ppt/slides/slide12.xml><?xml version="1.0" encoding="utf-8"?>
+<p:sld xmlns:a="http://schemas.openxmlformats.org/drawingml/2006/main" xmlns:r="http://schemas.openxmlformats.org/officeDocument/2006/relationships" xmlns:p="http://schemas.openxmlformats.org/presentationml/2006/main">
+  <p:cSld>
+    <p:spTree>
+      <p:nvGrpSpPr>
+        <p:cNvPr id="1" name=""/>
+        <p:cNvGrpSpPr/>
+        <p:nvPr/>
+      </p:nvGrpSpPr>
+      <p:grpSpPr>
+        <a:xfrm>
+          <a:off x="0" y="0"/>
+          <a:ext cx="0" cy="0"/>
+          <a:chOff x="0" y="0"/>
+          <a:chExt cx="0" cy="0"/>
+        </a:xfrm>
+      </p:grpSpPr>
+      <p:pic>
+        <p:nvPicPr>
+          <p:cNvPr id="4098" name="Picture 2"/>
+          <p:cNvPicPr>
+            <a:picLocks noChangeAspect="1" noChangeArrowheads="1"/>
+          </p:cNvPicPr>
+          <p:nvPr/>
+        </p:nvPicPr>
+        <p:blipFill>
+          <a:blip r:embed="rId2" cstate="print"/>
+          <a:srcRect/>
+          <a:stretch>
+            <a:fillRect/>
+          </a:stretch>
+        </p:blipFill>
+        <p:spPr bwMode="auto">
+          <a:xfrm>
+            <a:off x="1038600" y="365760"/>
+            <a:ext cx="6855719" cy="5944821"/>
+          </a:xfrm>
+          <a:prstGeom prst="rect">
+            <a:avLst/>
+          </a:prstGeom>
+          <a:noFill/>
+          <a:ln w="9525">
+            <a:noFill/>
+            <a:miter lim="800000"/>
+            <a:headEnd/>
+            <a:tailEnd/>
+          </a:ln>
+          <a:effectLst/>
+        </p:spPr>
+      </p:pic>
+    </p:spTree>
+  </p:cSld>
+  <p:clrMapOvr>
+    <a:masterClrMapping/>
+  </p:clrMapOvr>
+</p:sld>
+</file>
+
+<file path=ppt/slides/slide13.xml><?xml version="1.0" encoding="utf-8"?>
+<p:sld xmlns:a="http://schemas.openxmlformats.org/drawingml/2006/main" xmlns:r="http://schemas.openxmlformats.org/officeDocument/2006/relationships" xmlns:p="http://schemas.openxmlformats.org/presentationml/2006/main">
+  <p:cSld>
+    <p:spTree>
+      <p:nvGrpSpPr>
+        <p:cNvPr id="1" name=""/>
+        <p:cNvGrpSpPr/>
+        <p:nvPr/>
+      </p:nvGrpSpPr>
+      <p:grpSpPr>
+        <a:xfrm>
+          <a:off x="0" y="0"/>
+          <a:ext cx="0" cy="0"/>
+          <a:chOff x="0" y="0"/>
+          <a:chExt cx="0" cy="0"/>
+        </a:xfrm>
+      </p:grpSpPr>
+      <p:pic>
+        <p:nvPicPr>
+          <p:cNvPr id="1026" name="Picture 2"/>
+          <p:cNvPicPr>
+            <a:picLocks noChangeAspect="1" noChangeArrowheads="1"/>
+          </p:cNvPicPr>
+          <p:nvPr/>
+        </p:nvPicPr>
+        <p:blipFill>
+          <a:blip r:embed="rId2" cstate="print"/>
+          <a:srcRect/>
+          <a:stretch>
+            <a:fillRect/>
+          </a:stretch>
+        </p:blipFill>
+        <p:spPr bwMode="auto">
+          <a:xfrm>
+            <a:off x="899160" y="983618"/>
+            <a:ext cx="7702265" cy="5127622"/>
+          </a:xfrm>
+          <a:prstGeom prst="rect">
+            <a:avLst/>
+          </a:prstGeom>
+          <a:noFill/>
+          <a:ln w="9525">
+            <a:noFill/>
+            <a:miter lim="800000"/>
+            <a:headEnd/>
+            <a:tailEnd/>
+          </a:ln>
+          <a:effectLst/>
+        </p:spPr>
+      </p:pic>
+    </p:spTree>
+  </p:cSld>
+  <p:clrMapOvr>
+    <a:masterClrMapping/>
+  </p:clrMapOvr>
+</p:sld>
+</file>
+
+<file path=ppt/slides/slide14.xml><?xml version="1.0" encoding="utf-8"?>
+<p:sld xmlns:a="http://schemas.openxmlformats.org/drawingml/2006/main" xmlns:r="http://schemas.openxmlformats.org/officeDocument/2006/relationships" xmlns:p="http://schemas.openxmlformats.org/presentationml/2006/main">
+  <p:cSld>
+    <p:spTree>
+      <p:nvGrpSpPr>
+        <p:cNvPr id="1" name=""/>
+        <p:cNvGrpSpPr/>
+        <p:nvPr/>
+      </p:nvGrpSpPr>
+      <p:grpSpPr>
+        <a:xfrm>
+          <a:off x="0" y="0"/>
+          <a:ext cx="0" cy="0"/>
+          <a:chOff x="0" y="0"/>
+          <a:chExt cx="0" cy="0"/>
+        </a:xfrm>
+      </p:grpSpPr>
+      <p:sp>
+        <p:nvSpPr>
+          <p:cNvPr id="1558531" name="Rectangle 3"/>
+          <p:cNvSpPr>
+            <a:spLocks noChangeArrowheads="1"/>
+          </p:cNvSpPr>
+          <p:nvPr/>
+        </p:nvSpPr>
+        <p:spPr bwMode="auto">
+          <a:xfrm>
+            <a:off x="4271963" y="900113"/>
+            <a:ext cx="4872037" cy="2247411"/>
+          </a:xfrm>
+          <a:prstGeom prst="rect">
+            <a:avLst/>
+          </a:prstGeom>
+          <a:noFill/>
+          <a:ln w="9525">
+            <a:noFill/>
+            <a:miter lim="800000"/>
+            <a:headEnd/>
+            <a:tailEnd/>
+          </a:ln>
+          <a:effectLst/>
+        </p:spPr>
+        <p:txBody>
+          <a:bodyPr lIns="92075" tIns="46038" rIns="92075" bIns="46038">
+            <a:spAutoFit/>
+          </a:bodyPr>
+          <a:lstStyle/>
+          <a:p>
+            <a:pPr marL="285750" indent="-285750">
+              <a:spcBef>
+                <a:spcPct val="50000"/>
+              </a:spcBef>
+            </a:pPr>
+            <a:r>
+              <a:rPr lang="en-US" sz="2000" b="1" dirty="0">
+                <a:solidFill>
+                  <a:schemeClr val="tx2"/>
+                </a:solidFill>
+              </a:rPr>
+              <a:t>1) Ohm’s law is obeyed since the current still increases when V increases</a:t>
+            </a:r>
+          </a:p>
+          <a:p>
+            <a:pPr marL="285750" indent="-285750">
+              <a:spcBef>
+                <a:spcPct val="50000"/>
+              </a:spcBef>
+            </a:pPr>
+            <a:r>
+              <a:rPr lang="en-US" sz="2000" b="1" dirty="0">
+                <a:solidFill>
+                  <a:schemeClr val="tx2"/>
+                </a:solidFill>
+              </a:rPr>
+              <a:t>2) Ohm’s law is not obeyed</a:t>
+            </a:r>
+          </a:p>
+          <a:p>
+            <a:pPr marL="285750" indent="-285750">
+              <a:spcBef>
+                <a:spcPct val="50000"/>
+              </a:spcBef>
+            </a:pPr>
+            <a:r>
+              <a:rPr lang="en-US" sz="2000" b="1" dirty="0">
+                <a:solidFill>
+                  <a:schemeClr val="tx2"/>
+                </a:solidFill>
+              </a:rPr>
+              <a:t>3) </a:t>
+            </a:r>
+            <a:r>
+              <a:rPr lang="en-US" sz="2000" b="1" dirty="0">
+                <a:solidFill>
+                  <a:schemeClr val="tx2"/>
+                </a:solidFill>
+                <a:sym typeface="Symbol" pitchFamily="18" charset="2"/>
+              </a:rPr>
+              <a:t>This has nothing to do with Ohm’s law</a:t>
+            </a:r>
+            <a:endParaRPr lang="en-US" sz="2200" b="1" dirty="0">
+              <a:solidFill>
+                <a:schemeClr val="tx2"/>
+              </a:solidFill>
+              <a:sym typeface="Symbol" pitchFamily="18" charset="2"/>
+            </a:endParaRPr>
+          </a:p>
+        </p:txBody>
+      </p:sp>
+      <p:sp>
+        <p:nvSpPr>
+          <p:cNvPr id="1558532" name="Rectangle 4"/>
+          <p:cNvSpPr>
+            <a:spLocks noGrp="1" noChangeArrowheads="1"/>
+          </p:cNvSpPr>
+          <p:nvPr>
+            <p:ph type="title"/>
+          </p:nvPr>
+        </p:nvSpPr>
+        <p:spPr>
+          <a:xfrm>
+            <a:off x="660400" y="0"/>
+            <a:ext cx="8050213" cy="838200"/>
+          </a:xfrm>
+          <a:noFill/>
+          <a:ln/>
+        </p:spPr>
+        <p:txBody>
+          <a:bodyPr/>
+          <a:lstStyle/>
+          <a:p>
+            <a:pPr>
+              <a:lnSpc>
+                <a:spcPct val="90000"/>
+              </a:lnSpc>
+            </a:pPr>
+            <a:r>
+              <a:rPr lang="en-US" sz="2800" dirty="0"/>
+              <a:t>Question 223.37.5</a:t>
+            </a:r>
+            <a:endParaRPr lang="en-US" sz="2800" dirty="0">
+              <a:solidFill>
+                <a:schemeClr val="accent2"/>
+              </a:solidFill>
+            </a:endParaRPr>
+          </a:p>
+        </p:txBody>
+      </p:sp>
+      <p:sp>
+        <p:nvSpPr>
+          <p:cNvPr id="1558534" name="Rectangle 6"/>
+          <p:cNvSpPr>
+            <a:spLocks noGrp="1" noChangeArrowheads="1"/>
+          </p:cNvSpPr>
+          <p:nvPr>
+            <p:ph idx="1"/>
+          </p:nvPr>
+        </p:nvSpPr>
+        <p:spPr>
+          <a:xfrm>
+            <a:off x="0" y="881063"/>
+            <a:ext cx="4265613" cy="2395537"/>
+          </a:xfrm>
+          <a:noFill/>
+          <a:ln/>
+        </p:spPr>
+        <p:txBody>
+          <a:bodyPr>
+            <a:normAutofit fontScale="70000" lnSpcReduction="20000"/>
+          </a:bodyPr>
+          <a:lstStyle/>
+          <a:p>
+            <a:pPr marL="401638" indent="-401638">
+              <a:lnSpc>
+                <a:spcPct val="130000"/>
+              </a:lnSpc>
+              <a:spcBef>
+                <a:spcPct val="50000"/>
+              </a:spcBef>
+              <a:buFont typeface="Monotype Sorts" pitchFamily="2" charset="2"/>
+              <a:buNone/>
+            </a:pPr>
+            <a:r>
+              <a:rPr lang="en-US" b="1"/>
+              <a:t>	You double the </a:t>
+            </a:r>
+            <a:r>
+              <a:rPr lang="en-US" b="1" i="1">
+                <a:solidFill>
+                  <a:schemeClr val="accent2"/>
+                </a:solidFill>
+              </a:rPr>
+              <a:t>voltage</a:t>
+            </a:r>
+            <a:r>
+              <a:rPr lang="en-US" b="1"/>
+              <a:t> across a certain conductor and you observe the </a:t>
+            </a:r>
+            <a:r>
+              <a:rPr lang="en-US" b="1" i="1">
+                <a:solidFill>
+                  <a:schemeClr val="accent2"/>
+                </a:solidFill>
+              </a:rPr>
+              <a:t>current</a:t>
+            </a:r>
+            <a:r>
+              <a:rPr lang="en-US" b="1"/>
+              <a:t> increases three times.  What can you conclude?</a:t>
+            </a:r>
+            <a:endParaRPr lang="en-US" sz="2200" b="1"/>
+          </a:p>
+        </p:txBody>
+      </p:sp>
+      <p:sp>
+        <p:nvSpPr>
+          <p:cNvPr id="1558533" name="Rectangle 5"/>
+          <p:cNvSpPr>
+            <a:spLocks noChangeArrowheads="1"/>
+          </p:cNvSpPr>
+          <p:nvPr/>
+        </p:nvSpPr>
+        <p:spPr bwMode="auto">
+          <a:xfrm>
+            <a:off x="4572000" y="1219200"/>
+            <a:ext cx="4191000" cy="2209800"/>
+          </a:xfrm>
+          <a:prstGeom prst="rect">
+            <a:avLst/>
+          </a:prstGeom>
+          <a:noFill/>
+          <a:ln w="9525">
+            <a:noFill/>
+            <a:miter lim="800000"/>
+            <a:headEnd/>
+            <a:tailEnd/>
+          </a:ln>
+          <a:effectLst/>
+        </p:spPr>
+        <p:txBody>
+          <a:bodyPr lIns="90488" tIns="44450" rIns="90488" bIns="44450"/>
+          <a:lstStyle/>
+          <a:p>
+            <a:pPr marL="401638" indent="-401638">
+              <a:lnSpc>
+                <a:spcPct val="90000"/>
+              </a:lnSpc>
+              <a:spcBef>
+                <a:spcPct val="30000"/>
+              </a:spcBef>
+              <a:buClr>
+                <a:schemeClr val="bg2"/>
+              </a:buClr>
+              <a:buSzPct val="75000"/>
+              <a:buFont typeface="Monotype Sorts" pitchFamily="2" charset="2"/>
+              <a:buNone/>
+            </a:pPr>
+            <a:endParaRPr lang="en-US" sz="2000"/>
+          </a:p>
+        </p:txBody>
+      </p:sp>
+    </p:spTree>
+  </p:cSld>
+  <p:clrMapOvr>
+    <a:masterClrMapping/>
+  </p:clrMapOvr>
+</p:sld>
+</file>
+
+<file path=ppt/slides/slide15.xml><?xml version="1.0" encoding="utf-8"?>
+<p:sld xmlns:a="http://schemas.openxmlformats.org/drawingml/2006/main" xmlns:r="http://schemas.openxmlformats.org/officeDocument/2006/relationships" xmlns:p="http://schemas.openxmlformats.org/presentationml/2006/main">
+  <p:cSld>
+    <p:spTree>
+      <p:nvGrpSpPr>
+        <p:cNvPr id="1" name=""/>
+        <p:cNvGrpSpPr/>
+        <p:nvPr/>
+      </p:nvGrpSpPr>
+      <p:grpSpPr>
+        <a:xfrm>
+          <a:off x="0" y="0"/>
+          <a:ext cx="0" cy="0"/>
+          <a:chOff x="0" y="0"/>
+          <a:chExt cx="0" cy="0"/>
+        </a:xfrm>
+      </p:grpSpPr>
+      <p:sp>
+        <p:nvSpPr>
+          <p:cNvPr id="1560579" name="Rectangle 3"/>
+          <p:cNvSpPr>
+            <a:spLocks noChangeArrowheads="1"/>
+          </p:cNvSpPr>
+          <p:nvPr/>
+        </p:nvSpPr>
+        <p:spPr bwMode="auto">
+          <a:xfrm>
+            <a:off x="4271963" y="900113"/>
+            <a:ext cx="4872037" cy="2225675"/>
+          </a:xfrm>
+          <a:prstGeom prst="rect">
+            <a:avLst/>
+          </a:prstGeom>
+          <a:noFill/>
+          <a:ln w="9525">
+            <a:noFill/>
+            <a:miter lim="800000"/>
+            <a:headEnd/>
+            <a:tailEnd/>
+          </a:ln>
+          <a:effectLst/>
+        </p:spPr>
+        <p:txBody>
+          <a:bodyPr lIns="92075" tIns="46038" rIns="92075" bIns="46038">
+            <a:spAutoFit/>
+          </a:bodyPr>
+          <a:lstStyle/>
+          <a:p>
+            <a:pPr marL="285750" indent="-285750">
+              <a:spcBef>
+                <a:spcPct val="50000"/>
+              </a:spcBef>
+            </a:pPr>
+            <a:r>
+              <a:rPr lang="en-US" sz="2000" b="1">
+                <a:solidFill>
+                  <a:schemeClr val="tx2"/>
+                </a:solidFill>
+              </a:rPr>
+              <a:t>1)</a:t>
+            </a:r>
+            <a:r>
+              <a:rPr lang="en-US" sz="2000" b="1">
+                <a:solidFill>
+                  <a:schemeClr val="tx2"/>
+                </a:solidFill>
+                <a:effectLst>
+                  <a:outerShdw blurRad="38100" dist="38100" dir="2700000" algn="tl">
+                    <a:srgbClr val="000000"/>
+                  </a:outerShdw>
+                </a:effectLst>
+              </a:rPr>
+              <a:t> Ohm’s law is obeyed since the current still increases when V increases</a:t>
+            </a:r>
+          </a:p>
+          <a:p>
+            <a:pPr marL="285750" indent="-285750">
+              <a:spcBef>
+                <a:spcPct val="50000"/>
+              </a:spcBef>
+            </a:pPr>
+            <a:r>
+              <a:rPr lang="en-US" sz="2000" b="1">
+                <a:solidFill>
+                  <a:schemeClr val="tx2"/>
+                </a:solidFill>
+              </a:rPr>
+              <a:t>2) </a:t>
+            </a:r>
+            <a:r>
+              <a:rPr lang="en-US" sz="2000" b="1">
+                <a:solidFill>
+                  <a:schemeClr val="tx2"/>
+                </a:solidFill>
+                <a:effectLst>
+                  <a:outerShdw blurRad="38100" dist="38100" dir="2700000" algn="tl">
+                    <a:srgbClr val="000000"/>
+                  </a:outerShdw>
+                </a:effectLst>
+              </a:rPr>
+              <a:t>Ohm’s law is not obeyed</a:t>
+            </a:r>
+          </a:p>
+          <a:p>
+            <a:pPr marL="285750" indent="-285750">
+              <a:spcBef>
+                <a:spcPct val="50000"/>
+              </a:spcBef>
+            </a:pPr>
+            <a:r>
+              <a:rPr lang="en-US" sz="2000" b="1">
+                <a:solidFill>
+                  <a:schemeClr val="tx2"/>
+                </a:solidFill>
+              </a:rPr>
+              <a:t>3) </a:t>
+            </a:r>
+            <a:r>
+              <a:rPr lang="en-US" sz="2000" b="1">
+                <a:solidFill>
+                  <a:schemeClr val="tx2"/>
+                </a:solidFill>
+                <a:effectLst>
+                  <a:outerShdw blurRad="38100" dist="38100" dir="2700000" algn="tl">
+                    <a:srgbClr val="000000"/>
+                  </a:outerShdw>
+                </a:effectLst>
+                <a:sym typeface="Symbol" pitchFamily="18" charset="2"/>
+              </a:rPr>
+              <a:t>This has nothing to do with Ohm’s law</a:t>
+            </a:r>
+            <a:endParaRPr lang="en-US" sz="2200" b="1">
+              <a:solidFill>
+                <a:schemeClr val="tx2"/>
+              </a:solidFill>
+              <a:effectLst>
+                <a:outerShdw blurRad="38100" dist="38100" dir="2700000" algn="tl">
+                  <a:srgbClr val="000000"/>
+                </a:outerShdw>
+              </a:effectLst>
+              <a:sym typeface="Symbol" pitchFamily="18" charset="2"/>
+            </a:endParaRPr>
+          </a:p>
+        </p:txBody>
+      </p:sp>
+      <p:sp>
+        <p:nvSpPr>
+          <p:cNvPr id="1560580" name="AutoShape 4"/>
+          <p:cNvSpPr>
+            <a:spLocks noChangeArrowheads="1"/>
+          </p:cNvSpPr>
+          <p:nvPr/>
+        </p:nvSpPr>
+        <p:spPr bwMode="auto">
+          <a:xfrm>
+            <a:off x="541338" y="3227388"/>
+            <a:ext cx="5289550" cy="2370137"/>
+          </a:xfrm>
+          <a:prstGeom prst="roundRect">
+            <a:avLst>
+              <a:gd name="adj" fmla="val 16667"/>
+            </a:avLst>
+          </a:prstGeom>
+          <a:solidFill>
+            <a:schemeClr val="accent1"/>
+          </a:solidFill>
+          <a:ln w="38100">
+            <a:solidFill>
+              <a:srgbClr val="000000"/>
+            </a:solidFill>
+            <a:round/>
+            <a:headEnd type="none" w="sm" len="sm"/>
+            <a:tailEnd type="none" w="sm" len="sm"/>
+          </a:ln>
+          <a:effectLst/>
+        </p:spPr>
+        <p:txBody>
+          <a:bodyPr wrap="none" anchor="ctr"/>
+          <a:lstStyle/>
+          <a:p>
+            <a:pPr algn="ctr"/>
+            <a:endParaRPr lang="en-US">
+              <a:latin typeface="Times New Roman" pitchFamily="18" charset="0"/>
+            </a:endParaRPr>
+          </a:p>
+        </p:txBody>
+      </p:sp>
+      <p:sp>
+        <p:nvSpPr>
+          <p:cNvPr id="1560581" name="Rectangle 5"/>
+          <p:cNvSpPr>
+            <a:spLocks noChangeArrowheads="1"/>
+          </p:cNvSpPr>
+          <p:nvPr/>
+        </p:nvSpPr>
+        <p:spPr bwMode="auto">
+          <a:xfrm>
+            <a:off x="498475" y="3275013"/>
+            <a:ext cx="5383213" cy="2227262"/>
+          </a:xfrm>
+          <a:prstGeom prst="rect">
+            <a:avLst/>
+          </a:prstGeom>
+          <a:noFill/>
+          <a:ln w="9525">
+            <a:noFill/>
+            <a:miter lim="800000"/>
+            <a:headEnd/>
+            <a:tailEnd/>
+          </a:ln>
+          <a:effectLst/>
+        </p:spPr>
+        <p:txBody>
+          <a:bodyPr lIns="92075" tIns="46038" rIns="92075" bIns="46038">
+            <a:spAutoFit/>
+          </a:bodyPr>
+          <a:lstStyle/>
+          <a:p>
+            <a:pPr marL="285750" indent="-285750">
+              <a:lnSpc>
+                <a:spcPct val="140000"/>
+              </a:lnSpc>
+              <a:spcBef>
+                <a:spcPct val="50000"/>
+              </a:spcBef>
+            </a:pPr>
+            <a:r>
+              <a:rPr lang="en-US" sz="2000" b="1" dirty="0">
+                <a:solidFill>
+                  <a:schemeClr val="bg2"/>
+                </a:solidFill>
+              </a:rPr>
+              <a:t>	Ohm’s law, </a:t>
+            </a:r>
+            <a:r>
+              <a:rPr lang="en-US" sz="2000" b="1" i="1" dirty="0">
+                <a:solidFill>
+                  <a:srgbClr val="0066FF"/>
+                </a:solidFill>
+                <a:effectLst>
+                  <a:outerShdw blurRad="38100" dist="38100" dir="2700000" algn="tl">
+                    <a:srgbClr val="000000"/>
+                  </a:outerShdw>
+                </a:effectLst>
+              </a:rPr>
+              <a:t>V = I R</a:t>
+            </a:r>
+            <a:r>
+              <a:rPr lang="en-US" sz="2000" b="1" dirty="0">
+                <a:solidFill>
+                  <a:schemeClr val="bg2"/>
+                </a:solidFill>
+              </a:rPr>
+              <a:t>, states that the relationship between voltage and current is </a:t>
+            </a:r>
+            <a:r>
+              <a:rPr lang="en-US" sz="2000" b="1" dirty="0">
+                <a:solidFill>
+                  <a:schemeClr val="bg1"/>
+                </a:solidFill>
+                <a:effectLst>
+                  <a:outerShdw blurRad="38100" dist="38100" dir="2700000" algn="tl">
+                    <a:srgbClr val="000000"/>
+                  </a:outerShdw>
+                </a:effectLst>
+              </a:rPr>
+              <a:t>linear</a:t>
+            </a:r>
+            <a:r>
+              <a:rPr lang="en-US" sz="2000" b="1" dirty="0">
+                <a:solidFill>
+                  <a:schemeClr val="bg2"/>
+                </a:solidFill>
+              </a:rPr>
+              <a:t>.  Thus for a conductor that obeys Ohm’s Law, the current must double when you double the voltage.</a:t>
+            </a:r>
+          </a:p>
+        </p:txBody>
+      </p:sp>
+      <p:sp>
+        <p:nvSpPr>
+          <p:cNvPr id="1560582" name="Rectangle 6"/>
+          <p:cNvSpPr>
+            <a:spLocks noGrp="1" noChangeArrowheads="1"/>
+          </p:cNvSpPr>
+          <p:nvPr>
+            <p:ph type="title"/>
+          </p:nvPr>
+        </p:nvSpPr>
+        <p:spPr>
+          <a:xfrm>
+            <a:off x="660400" y="0"/>
+            <a:ext cx="8050213" cy="838200"/>
+          </a:xfrm>
+          <a:noFill/>
+          <a:ln/>
+        </p:spPr>
+        <p:txBody>
+          <a:bodyPr/>
+          <a:lstStyle/>
+          <a:p>
+            <a:pPr>
+              <a:lnSpc>
+                <a:spcPct val="90000"/>
+              </a:lnSpc>
+            </a:pPr>
+            <a:r>
+              <a:rPr lang="en-US" sz="2800" dirty="0"/>
+              <a:t>Question 223.37.5</a:t>
+            </a:r>
+            <a:endParaRPr lang="en-US" sz="2800" dirty="0">
+              <a:solidFill>
+                <a:schemeClr val="accent2"/>
+              </a:solidFill>
+            </a:endParaRPr>
+          </a:p>
+        </p:txBody>
+      </p:sp>
+      <p:sp>
+        <p:nvSpPr>
+          <p:cNvPr id="1560584" name="Rectangle 8"/>
+          <p:cNvSpPr>
+            <a:spLocks noGrp="1" noChangeArrowheads="1"/>
+          </p:cNvSpPr>
+          <p:nvPr>
+            <p:ph idx="1"/>
+          </p:nvPr>
+        </p:nvSpPr>
+        <p:spPr>
+          <a:xfrm>
+            <a:off x="0" y="881063"/>
+            <a:ext cx="4265613" cy="2395537"/>
+          </a:xfrm>
+          <a:noFill/>
+          <a:ln/>
+        </p:spPr>
+        <p:txBody>
+          <a:bodyPr>
+            <a:normAutofit fontScale="70000" lnSpcReduction="20000"/>
+          </a:bodyPr>
+          <a:lstStyle/>
+          <a:p>
+            <a:pPr marL="401638" indent="-401638">
+              <a:lnSpc>
+                <a:spcPct val="130000"/>
+              </a:lnSpc>
+              <a:spcBef>
+                <a:spcPct val="50000"/>
+              </a:spcBef>
+              <a:buFont typeface="Monotype Sorts" pitchFamily="2" charset="2"/>
+              <a:buNone/>
+            </a:pPr>
+            <a:r>
+              <a:rPr lang="en-US" b="1">
+                <a:effectLst>
+                  <a:outerShdw blurRad="38100" dist="38100" dir="2700000" algn="tl">
+                    <a:srgbClr val="000000"/>
+                  </a:outerShdw>
+                </a:effectLst>
+              </a:rPr>
+              <a:t>	You double the </a:t>
+            </a:r>
+            <a:r>
+              <a:rPr lang="en-US" b="1" i="1">
+                <a:solidFill>
+                  <a:schemeClr val="accent2"/>
+                </a:solidFill>
+                <a:effectLst>
+                  <a:outerShdw blurRad="38100" dist="38100" dir="2700000" algn="tl">
+                    <a:srgbClr val="000000"/>
+                  </a:outerShdw>
+                </a:effectLst>
+              </a:rPr>
+              <a:t>voltage</a:t>
+            </a:r>
+            <a:r>
+              <a:rPr lang="en-US" b="1">
+                <a:effectLst>
+                  <a:outerShdw blurRad="38100" dist="38100" dir="2700000" algn="tl">
+                    <a:srgbClr val="000000"/>
+                  </a:outerShdw>
+                </a:effectLst>
+              </a:rPr>
+              <a:t> across a certain conductor and you observe the </a:t>
+            </a:r>
+            <a:r>
+              <a:rPr lang="en-US" b="1" i="1">
+                <a:solidFill>
+                  <a:schemeClr val="accent2"/>
+                </a:solidFill>
+                <a:effectLst>
+                  <a:outerShdw blurRad="38100" dist="38100" dir="2700000" algn="tl">
+                    <a:srgbClr val="000000"/>
+                  </a:outerShdw>
+                </a:effectLst>
+              </a:rPr>
+              <a:t>current</a:t>
+            </a:r>
+            <a:r>
+              <a:rPr lang="en-US" b="1">
+                <a:effectLst>
+                  <a:outerShdw blurRad="38100" dist="38100" dir="2700000" algn="tl">
+                    <a:srgbClr val="000000"/>
+                  </a:outerShdw>
+                </a:effectLst>
+              </a:rPr>
+              <a:t> increases three times.  What can you conclude?</a:t>
+            </a:r>
+            <a:endParaRPr lang="en-US" sz="2200" b="1">
+              <a:effectLst>
+                <a:outerShdw blurRad="38100" dist="38100" dir="2700000" algn="tl">
+                  <a:srgbClr val="000000"/>
+                </a:outerShdw>
+              </a:effectLst>
+            </a:endParaRPr>
+          </a:p>
+        </p:txBody>
+      </p:sp>
+      <p:sp>
+        <p:nvSpPr>
+          <p:cNvPr id="1560583" name="Rectangle 7"/>
+          <p:cNvSpPr>
+            <a:spLocks noChangeArrowheads="1"/>
+          </p:cNvSpPr>
+          <p:nvPr/>
+        </p:nvSpPr>
+        <p:spPr bwMode="auto">
+          <a:xfrm>
+            <a:off x="4572000" y="1219200"/>
+            <a:ext cx="4191000" cy="2209800"/>
+          </a:xfrm>
+          <a:prstGeom prst="rect">
+            <a:avLst/>
+          </a:prstGeom>
+          <a:noFill/>
+          <a:ln w="9525">
+            <a:noFill/>
+            <a:miter lim="800000"/>
+            <a:headEnd/>
+            <a:tailEnd/>
+          </a:ln>
+          <a:effectLst/>
+        </p:spPr>
+        <p:txBody>
+          <a:bodyPr lIns="90488" tIns="44450" rIns="90488" bIns="44450"/>
+          <a:lstStyle/>
+          <a:p>
+            <a:pPr marL="401638" indent="-401638">
+              <a:lnSpc>
+                <a:spcPct val="90000"/>
+              </a:lnSpc>
+              <a:spcBef>
+                <a:spcPct val="30000"/>
+              </a:spcBef>
+              <a:buClr>
+                <a:schemeClr val="bg2"/>
+              </a:buClr>
+              <a:buSzPct val="75000"/>
+              <a:buFont typeface="Monotype Sorts" pitchFamily="2" charset="2"/>
+              <a:buNone/>
+            </a:pPr>
+            <a:endParaRPr lang="en-US" sz="2000">
+              <a:effectLst>
+                <a:outerShdw blurRad="38100" dist="38100" dir="2700000" algn="tl">
+                  <a:srgbClr val="000000"/>
+                </a:outerShdw>
+              </a:effectLst>
+            </a:endParaRPr>
+          </a:p>
+        </p:txBody>
+      </p:sp>
+      <p:sp>
+        <p:nvSpPr>
+          <p:cNvPr id="1560585" name="Oval 9"/>
+          <p:cNvSpPr>
+            <a:spLocks noChangeArrowheads="1"/>
+          </p:cNvSpPr>
+          <p:nvPr/>
+        </p:nvSpPr>
+        <p:spPr bwMode="auto">
+          <a:xfrm>
+            <a:off x="3919833" y="1603375"/>
+            <a:ext cx="4630737" cy="542925"/>
+          </a:xfrm>
+          <a:prstGeom prst="ellipse">
+            <a:avLst/>
+          </a:prstGeom>
+          <a:noFill/>
+          <a:ln w="38100">
+            <a:solidFill>
+              <a:schemeClr val="accent1"/>
+            </a:solidFill>
+            <a:round/>
+            <a:headEnd/>
+            <a:tailEnd/>
+          </a:ln>
+          <a:effectLst/>
+        </p:spPr>
+        <p:txBody>
+          <a:bodyPr anchor="ctr">
+            <a:spAutoFit/>
+          </a:bodyPr>
+          <a:lstStyle/>
+          <a:p>
+            <a:endParaRPr lang="en-US"/>
+          </a:p>
+        </p:txBody>
+      </p:sp>
+      <p:pic>
+        <p:nvPicPr>
+          <p:cNvPr id="1560586" name="Picture 10" descr="FG18_009"/>
+          <p:cNvPicPr>
+            <a:picLocks noChangeAspect="1" noChangeArrowheads="1"/>
+          </p:cNvPicPr>
+          <p:nvPr/>
+        </p:nvPicPr>
+        <p:blipFill>
+          <a:blip r:embed="rId3" cstate="print"/>
+          <a:srcRect l="36220" t="13840" r="37407" b="16933"/>
+          <a:stretch>
+            <a:fillRect/>
+          </a:stretch>
+        </p:blipFill>
+        <p:spPr bwMode="auto">
+          <a:xfrm>
+            <a:off x="6859588" y="3267075"/>
+            <a:ext cx="2284412" cy="3309938"/>
+          </a:xfrm>
+          <a:prstGeom prst="rect">
+            <a:avLst/>
+          </a:prstGeom>
+          <a:noFill/>
+        </p:spPr>
+      </p:pic>
+      <p:sp>
+        <p:nvSpPr>
+          <p:cNvPr id="1560587" name="Text Box 11"/>
+          <p:cNvSpPr txBox="1">
+            <a:spLocks noChangeArrowheads="1"/>
+          </p:cNvSpPr>
+          <p:nvPr/>
+        </p:nvSpPr>
+        <p:spPr bwMode="auto">
+          <a:xfrm>
+            <a:off x="0" y="6091238"/>
+            <a:ext cx="6869113" cy="406400"/>
+          </a:xfrm>
+          <a:prstGeom prst="rect">
+            <a:avLst/>
+          </a:prstGeom>
+          <a:solidFill>
+            <a:srgbClr val="3366FF"/>
+          </a:solidFill>
+          <a:ln w="9525">
+            <a:solidFill>
+              <a:schemeClr val="tx2"/>
+            </a:solidFill>
+            <a:miter lim="800000"/>
+            <a:headEnd type="none" w="sm" len="sm"/>
+            <a:tailEnd type="none" w="sm" len="sm"/>
+          </a:ln>
+          <a:effectLst/>
+        </p:spPr>
+        <p:txBody>
+          <a:bodyPr>
+            <a:spAutoFit/>
+          </a:bodyPr>
+          <a:lstStyle/>
+          <a:p>
+            <a:pPr algn="ctr"/>
+            <a:r>
+              <a:rPr lang="en-US" sz="2000" b="1">
+                <a:solidFill>
+                  <a:srgbClr val="000000"/>
+                </a:solidFill>
+                <a:effectLst>
+                  <a:outerShdw blurRad="38100" dist="38100" dir="2700000" algn="tl">
+                    <a:srgbClr val="FFFFFF"/>
+                  </a:outerShdw>
+                </a:effectLst>
+              </a:rPr>
+              <a:t>Follow-up:</a:t>
+            </a:r>
+            <a:r>
+              <a:rPr lang="en-US" sz="2000" b="1">
+                <a:effectLst>
+                  <a:outerShdw blurRad="38100" dist="38100" dir="2700000" algn="tl">
+                    <a:srgbClr val="000000"/>
+                  </a:outerShdw>
+                </a:effectLst>
+              </a:rPr>
+              <a:t>  Where could this situation occur?</a:t>
+            </a:r>
+          </a:p>
+        </p:txBody>
+      </p:sp>
+    </p:spTree>
+  </p:cSld>
+  <p:clrMapOvr>
+    <a:masterClrMapping/>
+  </p:clrMapOvr>
+  <p:timing>
+    <p:tnLst>
+      <p:par>
+        <p:cTn id="1" dur="indefinite" restart="never" nodeType="tmRoot">
+          <p:childTnLst>
+            <p:seq concurrent="1" nextAc="seek">
+              <p:cTn id="2" dur="indefinite" nodeType="mainSeq">
+                <p:childTnLst>
+                  <p:par>
+                    <p:cTn id="3" fill="hold">
+                      <p:stCondLst>
+                        <p:cond delay="indefinite"/>
+                      </p:stCondLst>
+                      <p:childTnLst>
+                        <p:par>
+                          <p:cTn id="4" fill="hold">
+                            <p:stCondLst>
+                              <p:cond delay="0"/>
+                            </p:stCondLst>
+                            <p:childTnLst>
+                              <p:par>
+                                <p:cTn id="5" presetID="17" presetClass="entr" presetSubtype="1" fill="hold" nodeType="clickEffect">
+                                  <p:stCondLst>
+                                    <p:cond delay="0"/>
+                                  </p:stCondLst>
+                                  <p:childTnLst>
+                                    <p:set>
+                                      <p:cBhvr>
+                                        <p:cTn id="6" dur="1" fill="hold">
+                                          <p:stCondLst>
+                                            <p:cond delay="0"/>
+                                          </p:stCondLst>
+                                        </p:cTn>
+                                        <p:tgtEl>
+                                          <p:spTgt spid="1560586"/>
+                                        </p:tgtEl>
+                                        <p:attrNameLst>
+                                          <p:attrName>style.visibility</p:attrName>
+                                        </p:attrNameLst>
+                                      </p:cBhvr>
+                                      <p:to>
+                                        <p:strVal val="visible"/>
+                                      </p:to>
+                                    </p:set>
+                                    <p:anim calcmode="lin" valueType="num">
+                                      <p:cBhvr>
+                                        <p:cTn id="7" dur="500" fill="hold"/>
+                                        <p:tgtEl>
+                                          <p:spTgt spid="1560586"/>
+                                        </p:tgtEl>
+                                        <p:attrNameLst>
+                                          <p:attrName>ppt_x</p:attrName>
+                                        </p:attrNameLst>
+                                      </p:cBhvr>
+                                      <p:tavLst>
+                                        <p:tav tm="0">
+                                          <p:val>
+                                            <p:strVal val="#ppt_x"/>
+                                          </p:val>
+                                        </p:tav>
+                                        <p:tav tm="100000">
+                                          <p:val>
+                                            <p:strVal val="#ppt_x"/>
+                                          </p:val>
+                                        </p:tav>
+                                      </p:tavLst>
+                                    </p:anim>
+                                    <p:anim calcmode="lin" valueType="num">
+                                      <p:cBhvr>
+                                        <p:cTn id="8" dur="500" fill="hold"/>
+                                        <p:tgtEl>
+                                          <p:spTgt spid="1560586"/>
+                                        </p:tgtEl>
+                                        <p:attrNameLst>
+                                          <p:attrName>ppt_y</p:attrName>
+                                        </p:attrNameLst>
+                                      </p:cBhvr>
+                                      <p:tavLst>
+                                        <p:tav tm="0">
+                                          <p:val>
+                                            <p:strVal val="#ppt_y-#ppt_h/2"/>
+                                          </p:val>
+                                        </p:tav>
+                                        <p:tav tm="100000">
+                                          <p:val>
+                                            <p:strVal val="#ppt_y"/>
+                                          </p:val>
+                                        </p:tav>
+                                      </p:tavLst>
+                                    </p:anim>
+                                    <p:anim calcmode="lin" valueType="num">
+                                      <p:cBhvr>
+                                        <p:cTn id="9" dur="500" fill="hold"/>
+                                        <p:tgtEl>
+                                          <p:spTgt spid="1560586"/>
+                                        </p:tgtEl>
+                                        <p:attrNameLst>
+                                          <p:attrName>ppt_w</p:attrName>
+                                        </p:attrNameLst>
+                                      </p:cBhvr>
+                                      <p:tavLst>
+                                        <p:tav tm="0">
+                                          <p:val>
+                                            <p:strVal val="#ppt_w"/>
+                                          </p:val>
+                                        </p:tav>
+                                        <p:tav tm="100000">
+                                          <p:val>
+                                            <p:strVal val="#ppt_w"/>
+                                          </p:val>
+                                        </p:tav>
+                                      </p:tavLst>
+                                    </p:anim>
+                                    <p:anim calcmode="lin" valueType="num">
+                                      <p:cBhvr>
+                                        <p:cTn id="10" dur="500" fill="hold"/>
+                                        <p:tgtEl>
+                                          <p:spTgt spid="1560586"/>
+                                        </p:tgtEl>
+                                        <p:attrNameLst>
+                                          <p:attrName>ppt_h</p:attrName>
+                                        </p:attrNameLst>
+                                      </p:cBhvr>
+                                      <p:tavLst>
+                                        <p:tav tm="0">
+                                          <p:val>
+                                            <p:fltVal val="0"/>
+                                          </p:val>
+                                        </p:tav>
+                                        <p:tav tm="100000">
+                                          <p:val>
+                                            <p:strVal val="#ppt_h"/>
+                                          </p:val>
+                                        </p:tav>
+                                      </p:tavLst>
+                                    </p:anim>
+                                  </p:childTnLst>
+                                </p:cTn>
+                              </p:par>
+                            </p:childTnLst>
+                          </p:cTn>
+                        </p:par>
+                      </p:childTnLst>
+                    </p:cTn>
+                  </p:par>
+                </p:childTnLst>
+              </p:cTn>
+              <p:prevCondLst>
+                <p:cond evt="onPrev" delay="0">
+                  <p:tgtEl>
+                    <p:sldTgt/>
+                  </p:tgtEl>
+                </p:cond>
+              </p:prevCondLst>
+              <p:nextCondLst>
+                <p:cond evt="onNext" delay="0">
+                  <p:tgtEl>
+                    <p:sldTgt/>
+                  </p:tgtEl>
+                </p:cond>
+              </p:nextCondLst>
+            </p:seq>
+          </p:childTnLst>
+        </p:cTn>
+      </p:par>
+    </p:tnLst>
+  </p:timing>
+</p:sld>
+</file>
+
+<file path=ppt/slides/slide16.xml><?xml version="1.0" encoding="utf-8"?>
+<p:sld xmlns:a="http://schemas.openxmlformats.org/drawingml/2006/main" xmlns:r="http://schemas.openxmlformats.org/officeDocument/2006/relationships" xmlns:p="http://schemas.openxmlformats.org/presentationml/2006/main">
+  <p:cSld>
+    <p:spTree>
+      <p:nvGrpSpPr>
+        <p:cNvPr id="1" name=""/>
+        <p:cNvGrpSpPr/>
+        <p:nvPr/>
+      </p:nvGrpSpPr>
+      <p:grpSpPr>
+        <a:xfrm>
+          <a:off x="0" y="0"/>
+          <a:ext cx="0" cy="0"/>
+          <a:chOff x="0" y="0"/>
+          <a:chExt cx="0" cy="0"/>
+        </a:xfrm>
+      </p:grpSpPr>
+      <p:sp>
+        <p:nvSpPr>
+          <p:cNvPr id="2" name="Title 1"/>
+          <p:cNvSpPr>
+            <a:spLocks noGrp="1"/>
+          </p:cNvSpPr>
+          <p:nvPr>
+            <p:ph type="title"/>
+          </p:nvPr>
+        </p:nvSpPr>
+        <p:spPr/>
+        <p:txBody>
+          <a:bodyPr/>
+          <a:lstStyle/>
+          <a:p>
+            <a:r>
+              <a:rPr lang="en-US" dirty="0"/>
+              <a:t>Question 233.37.6</a:t>
+            </a:r>
+          </a:p>
+        </p:txBody>
+      </p:sp>
+      <p:sp>
+        <p:nvSpPr>
+          <p:cNvPr id="3" name="Content Placeholder 2"/>
+          <p:cNvSpPr>
+            <a:spLocks noGrp="1"/>
+          </p:cNvSpPr>
+          <p:nvPr>
+            <p:ph idx="1"/>
+          </p:nvPr>
+        </p:nvSpPr>
+        <p:spPr/>
+        <p:txBody>
+          <a:bodyPr/>
+          <a:lstStyle/>
+          <a:p>
+            <a:pPr>
+              <a:buNone/>
+            </a:pPr>
+            <a:r>
+              <a:rPr lang="en-US" dirty="0"/>
+              <a:t>Where is the most probable place to find a magnetic monopole (a free magnetic north pole or south pole on it’s own)</a:t>
+            </a:r>
+          </a:p>
+          <a:p>
+            <a:pPr marL="514350" indent="-514350">
+              <a:buFont typeface="+mj-lt"/>
+              <a:buAutoNum type="alphaLcParenR"/>
+            </a:pPr>
+            <a:r>
+              <a:rPr lang="en-US" dirty="0"/>
+              <a:t>In the beam of linear accelerators</a:t>
+            </a:r>
+          </a:p>
+          <a:p>
+            <a:pPr marL="514350" indent="-514350">
+              <a:buFont typeface="+mj-lt"/>
+              <a:buAutoNum type="alphaLcParenR"/>
+            </a:pPr>
+            <a:r>
+              <a:rPr lang="en-US" dirty="0"/>
+              <a:t>In pieces of broken magnets</a:t>
+            </a:r>
+          </a:p>
+          <a:p>
+            <a:pPr marL="514350" indent="-514350">
+              <a:buFont typeface="+mj-lt"/>
+              <a:buAutoNum type="alphaLcParenR"/>
+            </a:pPr>
+            <a:r>
+              <a:rPr lang="en-US" dirty="0"/>
+              <a:t>In atoms</a:t>
+            </a:r>
+          </a:p>
+          <a:p>
+            <a:pPr marL="514350" indent="-514350">
+              <a:buFont typeface="+mj-lt"/>
+              <a:buAutoNum type="alphaLcParenR"/>
+            </a:pPr>
+            <a:r>
+              <a:rPr lang="en-US" dirty="0"/>
+              <a:t>In science fiction novels</a:t>
+            </a:r>
+          </a:p>
+        </p:txBody>
+      </p:sp>
+      <p:sp>
+        <p:nvSpPr>
+          <p:cNvPr id="4" name="Slide Number Placeholder 3"/>
+          <p:cNvSpPr>
+            <a:spLocks noGrp="1"/>
+          </p:cNvSpPr>
+          <p:nvPr>
+            <p:ph type="sldNum" sz="quarter" idx="12"/>
+          </p:nvPr>
+        </p:nvSpPr>
+        <p:spPr/>
+        <p:txBody>
+          <a:bodyPr/>
+          <a:lstStyle/>
+          <a:p>
+            <a:pPr>
+              <a:defRPr/>
+            </a:pPr>
+            <a:fld id="{64137B81-8888-4253-92EC-0AED2A590749}" type="slidenum">
+              <a:rPr lang="en-US" smtClean="0"/>
+              <a:pPr>
+                <a:defRPr/>
+              </a:pPr>
+              <a:t>16</a:t>
+            </a:fld>
+            <a:endParaRPr lang="en-US"/>
+          </a:p>
+        </p:txBody>
+      </p:sp>
+    </p:spTree>
+  </p:cSld>
+  <p:clrMapOvr>
+    <a:masterClrMapping/>
+  </p:clrMapOvr>
+</p:sld>
+</file>
+
+<file path=ppt/slides/slide17.xml><?xml version="1.0" encoding="utf-8"?>
+<p:sld xmlns:a="http://schemas.openxmlformats.org/drawingml/2006/main" xmlns:r="http://schemas.openxmlformats.org/officeDocument/2006/relationships" xmlns:p="http://schemas.openxmlformats.org/presentationml/2006/main">
+  <p:cSld>
+    <p:spTree>
+      <p:nvGrpSpPr>
+        <p:cNvPr id="1" name=""/>
+        <p:cNvGrpSpPr/>
+        <p:nvPr/>
+      </p:nvGrpSpPr>
+      <p:grpSpPr>
+        <a:xfrm>
+          <a:off x="0" y="0"/>
+          <a:ext cx="0" cy="0"/>
+          <a:chOff x="0" y="0"/>
+          <a:chExt cx="0" cy="0"/>
+        </a:xfrm>
+      </p:grpSpPr>
+      <p:sp>
+        <p:nvSpPr>
+          <p:cNvPr id="2" name="Title 1">
+            <a:extLst>
+              <a:ext uri="{FF2B5EF4-FFF2-40B4-BE49-F238E27FC236}">
+                <a16:creationId xmlns:a16="http://schemas.microsoft.com/office/drawing/2014/main" id="{B03D8388-3367-9D2A-7FD6-BBBE5822EF5D}"/>
+              </a:ext>
+            </a:extLst>
+          </p:cNvPr>
+          <p:cNvSpPr>
+            <a:spLocks noGrp="1"/>
+          </p:cNvSpPr>
+          <p:nvPr>
+            <p:ph type="title"/>
+          </p:nvPr>
+        </p:nvSpPr>
+        <p:spPr/>
+        <p:txBody>
+          <a:bodyPr/>
+          <a:lstStyle/>
+          <a:p>
+            <a:endParaRPr lang="en-US"/>
+          </a:p>
+        </p:txBody>
+      </p:sp>
+      <p:sp>
+        <p:nvSpPr>
+          <p:cNvPr id="3" name="Content Placeholder 2">
+            <a:extLst>
+              <a:ext uri="{FF2B5EF4-FFF2-40B4-BE49-F238E27FC236}">
+                <a16:creationId xmlns:a16="http://schemas.microsoft.com/office/drawing/2014/main" id="{6FA08FEE-A113-6D78-A404-733E84D99489}"/>
+              </a:ext>
+            </a:extLst>
+          </p:cNvPr>
+          <p:cNvSpPr>
+            <a:spLocks noGrp="1"/>
+          </p:cNvSpPr>
+          <p:nvPr>
+            <p:ph idx="1"/>
+          </p:nvPr>
+        </p:nvSpPr>
+        <p:spPr/>
+        <p:txBody>
+          <a:bodyPr/>
+          <a:lstStyle/>
+          <a:p>
+            <a:endParaRPr lang="en-US"/>
+          </a:p>
+        </p:txBody>
+      </p:sp>
+      <p:pic>
+        <p:nvPicPr>
+          <p:cNvPr id="5" name="Graphic 4">
+            <a:extLst>
+              <a:ext uri="{FF2B5EF4-FFF2-40B4-BE49-F238E27FC236}">
+                <a16:creationId xmlns:a16="http://schemas.microsoft.com/office/drawing/2014/main" id="{FA6FBA52-D007-A081-4D30-7B8228119B89}"/>
+              </a:ext>
+            </a:extLst>
+          </p:cNvPr>
+          <p:cNvPicPr>
+            <a:picLocks noChangeAspect="1"/>
+          </p:cNvPicPr>
+          <p:nvPr/>
+        </p:nvPicPr>
+        <p:blipFill>
+          <a:blip r:embed="rId2">
+            <a:extLst>
+              <a:ext uri="{96DAC541-7B7A-43D3-8B79-37D633B846F1}">
+                <asvg:svgBlip xmlns:asvg="http://schemas.microsoft.com/office/drawing/2016/SVG/main" r:embed="rId3"/>
+              </a:ext>
+            </a:extLst>
+          </a:blip>
+          <a:stretch>
+            <a:fillRect/>
+          </a:stretch>
+        </p:blipFill>
+        <p:spPr>
+          <a:xfrm>
+            <a:off x="0" y="1279311"/>
+            <a:ext cx="9144000" cy="4299378"/>
+          </a:xfrm>
+          <a:prstGeom prst="rect">
+            <a:avLst/>
+          </a:prstGeom>
+        </p:spPr>
+      </p:pic>
+    </p:spTree>
+    <p:extLst>
+      <p:ext uri="{BB962C8B-B14F-4D97-AF65-F5344CB8AC3E}">
+        <p14:creationId xmlns:p14="http://schemas.microsoft.com/office/powerpoint/2010/main" val="3452187060"/>
+      </p:ext>
+    </p:extLst>
+  </p:cSld>
+  <p:clrMapOvr>
+    <a:masterClrMapping/>
+  </p:clrMapOvr>
+</p:sld>
+</file>
+
+<file path=ppt/slides/slide18.xml><?xml version="1.0" encoding="utf-8"?>
+<p:sld xmlns:a="http://schemas.openxmlformats.org/drawingml/2006/main" xmlns:r="http://schemas.openxmlformats.org/officeDocument/2006/relationships" xmlns:p="http://schemas.openxmlformats.org/presentationml/2006/main">
+  <p:cSld>
+    <p:spTree>
+      <p:nvGrpSpPr>
+        <p:cNvPr id="1" name=""/>
+        <p:cNvGrpSpPr/>
+        <p:nvPr/>
+      </p:nvGrpSpPr>
+      <p:grpSpPr>
+        <a:xfrm>
+          <a:off x="0" y="0"/>
+          <a:ext cx="0" cy="0"/>
+          <a:chOff x="0" y="0"/>
+          <a:chExt cx="0" cy="0"/>
+        </a:xfrm>
+      </p:grpSpPr>
+      <p:sp>
+        <p:nvSpPr>
+          <p:cNvPr id="2" name="Title 1">
+            <a:extLst>
+              <a:ext uri="{FF2B5EF4-FFF2-40B4-BE49-F238E27FC236}">
+                <a16:creationId xmlns:a16="http://schemas.microsoft.com/office/drawing/2014/main" id="{960448D1-E8C8-DBA8-CF32-310DFA6777F1}"/>
+              </a:ext>
+            </a:extLst>
+          </p:cNvPr>
+          <p:cNvSpPr>
+            <a:spLocks noGrp="1"/>
+          </p:cNvSpPr>
+          <p:nvPr>
+            <p:ph type="title"/>
+          </p:nvPr>
+        </p:nvSpPr>
+        <p:spPr/>
+        <p:txBody>
+          <a:bodyPr/>
+          <a:lstStyle/>
+          <a:p>
+            <a:endParaRPr lang="en-US"/>
+          </a:p>
+        </p:txBody>
+      </p:sp>
+      <p:sp>
+        <p:nvSpPr>
+          <p:cNvPr id="3" name="Content Placeholder 2">
+            <a:extLst>
+              <a:ext uri="{FF2B5EF4-FFF2-40B4-BE49-F238E27FC236}">
+                <a16:creationId xmlns:a16="http://schemas.microsoft.com/office/drawing/2014/main" id="{64FC4ACE-6071-94B7-56A6-B06666FB7ACE}"/>
+              </a:ext>
+            </a:extLst>
+          </p:cNvPr>
+          <p:cNvSpPr>
+            <a:spLocks noGrp="1"/>
+          </p:cNvSpPr>
+          <p:nvPr>
+            <p:ph idx="1"/>
+          </p:nvPr>
+        </p:nvSpPr>
+        <p:spPr/>
+        <p:txBody>
+          <a:bodyPr/>
+          <a:lstStyle/>
+          <a:p>
+            <a:endParaRPr lang="en-US"/>
+          </a:p>
+        </p:txBody>
+      </p:sp>
+      <p:pic>
+        <p:nvPicPr>
+          <p:cNvPr id="5" name="Graphic 4">
+            <a:extLst>
+              <a:ext uri="{FF2B5EF4-FFF2-40B4-BE49-F238E27FC236}">
+                <a16:creationId xmlns:a16="http://schemas.microsoft.com/office/drawing/2014/main" id="{605FCD64-3799-C8F4-15F5-6A6DA70545CA}"/>
+              </a:ext>
+            </a:extLst>
+          </p:cNvPr>
+          <p:cNvPicPr>
+            <a:picLocks noChangeAspect="1"/>
+          </p:cNvPicPr>
+          <p:nvPr/>
+        </p:nvPicPr>
+        <p:blipFill>
+          <a:blip r:embed="rId2">
+            <a:extLst>
+              <a:ext uri="{96DAC541-7B7A-43D3-8B79-37D633B846F1}">
+                <asvg:svgBlip xmlns:asvg="http://schemas.microsoft.com/office/drawing/2016/SVG/main" r:embed="rId3"/>
+              </a:ext>
+            </a:extLst>
+          </a:blip>
+          <a:stretch>
+            <a:fillRect/>
+          </a:stretch>
+        </p:blipFill>
+        <p:spPr>
+          <a:xfrm>
+            <a:off x="2828925" y="2319337"/>
+            <a:ext cx="3486150" cy="2219325"/>
+          </a:xfrm>
+          <a:prstGeom prst="rect">
+            <a:avLst/>
+          </a:prstGeom>
+        </p:spPr>
+      </p:pic>
+    </p:spTree>
+    <p:extLst>
+      <p:ext uri="{BB962C8B-B14F-4D97-AF65-F5344CB8AC3E}">
+        <p14:creationId xmlns:p14="http://schemas.microsoft.com/office/powerpoint/2010/main" val="3828300500"/>
+      </p:ext>
+    </p:extLst>
+  </p:cSld>
+  <p:clrMapOvr>
+    <a:masterClrMapping/>
+  </p:clrMapOvr>
+</p:sld>
+</file>
+
+<file path=ppt/slides/slide19.xml><?xml version="1.0" encoding="utf-8"?>
+<p:sld xmlns:a="http://schemas.openxmlformats.org/drawingml/2006/main" xmlns:r="http://schemas.openxmlformats.org/officeDocument/2006/relationships" xmlns:p="http://schemas.openxmlformats.org/presentationml/2006/main">
+  <p:cSld>
+    <p:spTree>
+      <p:nvGrpSpPr>
+        <p:cNvPr id="1" name=""/>
+        <p:cNvGrpSpPr/>
+        <p:nvPr/>
+      </p:nvGrpSpPr>
+      <p:grpSpPr>
+        <a:xfrm>
+          <a:off x="0" y="0"/>
+          <a:ext cx="0" cy="0"/>
+          <a:chOff x="0" y="0"/>
+          <a:chExt cx="0" cy="0"/>
+        </a:xfrm>
+      </p:grpSpPr>
+      <p:pic>
+        <p:nvPicPr>
+          <p:cNvPr id="5" name="Graphic 4">
+            <a:extLst>
+              <a:ext uri="{FF2B5EF4-FFF2-40B4-BE49-F238E27FC236}">
+                <a16:creationId xmlns:a16="http://schemas.microsoft.com/office/drawing/2014/main" id="{6CF1B837-2C95-8F54-F938-A3C21FDE1393}"/>
+              </a:ext>
+            </a:extLst>
+          </p:cNvPr>
+          <p:cNvPicPr>
+            <a:picLocks noChangeAspect="1"/>
+          </p:cNvPicPr>
+          <p:nvPr/>
+        </p:nvPicPr>
+        <p:blipFill>
+          <a:blip r:embed="rId2">
+            <a:extLst>
+              <a:ext uri="{96DAC541-7B7A-43D3-8B79-37D633B846F1}">
+                <asvg:svgBlip xmlns:asvg="http://schemas.microsoft.com/office/drawing/2016/SVG/main" r:embed="rId3"/>
+              </a:ext>
+            </a:extLst>
+          </a:blip>
+          <a:stretch>
+            <a:fillRect/>
+          </a:stretch>
+        </p:blipFill>
+        <p:spPr>
+          <a:xfrm>
+            <a:off x="0" y="1371995"/>
+            <a:ext cx="9144000" cy="4114010"/>
+          </a:xfrm>
+          <a:prstGeom prst="rect">
+            <a:avLst/>
+          </a:prstGeom>
+        </p:spPr>
+      </p:pic>
+    </p:spTree>
+    <p:extLst>
+      <p:ext uri="{BB962C8B-B14F-4D97-AF65-F5344CB8AC3E}">
+        <p14:creationId xmlns:p14="http://schemas.microsoft.com/office/powerpoint/2010/main" val="3770458863"/>
+      </p:ext>
+    </p:extLst>
+  </p:cSld>
+  <p:clrMapOvr>
+    <a:masterClrMapping/>
+  </p:clrMapOvr>
+</p:sld>
+</file>
+
+<file path=ppt/slides/slide2.xml><?xml version="1.0" encoding="utf-8"?>
+<p:sld xmlns:a="http://schemas.openxmlformats.org/drawingml/2006/main" xmlns:r="http://schemas.openxmlformats.org/officeDocument/2006/relationships" xmlns:p="http://schemas.openxmlformats.org/presentationml/2006/main">
+  <p:cSld>
+    <p:spTree>
+      <p:nvGrpSpPr>
+        <p:cNvPr id="1" name=""/>
+        <p:cNvGrpSpPr/>
+        <p:nvPr/>
+      </p:nvGrpSpPr>
+      <p:grpSpPr>
+        <a:xfrm>
+          <a:off x="0" y="0"/>
+          <a:ext cx="0" cy="0"/>
+          <a:chOff x="0" y="0"/>
+          <a:chExt cx="0" cy="0"/>
+        </a:xfrm>
+      </p:grpSpPr>
+      <p:sp>
+        <p:nvSpPr>
+          <p:cNvPr id="2" name="Title 1">
+            <a:extLst>
+              <a:ext uri="{FF2B5EF4-FFF2-40B4-BE49-F238E27FC236}">
+                <a16:creationId xmlns:a16="http://schemas.microsoft.com/office/drawing/2014/main" id="{0551FCBA-E394-7DDD-C0D1-FB9205FFF3F3}"/>
+              </a:ext>
+            </a:extLst>
+          </p:cNvPr>
+          <p:cNvSpPr>
+            <a:spLocks noGrp="1"/>
+          </p:cNvSpPr>
+          <p:nvPr>
+            <p:ph type="title"/>
+          </p:nvPr>
+        </p:nvSpPr>
+        <p:spPr/>
+        <p:txBody>
+          <a:bodyPr/>
+          <a:lstStyle/>
+          <a:p>
+            <a:r>
+              <a:rPr lang="en-US" dirty="0"/>
+              <a:t>Question</a:t>
+            </a:r>
+          </a:p>
+        </p:txBody>
+      </p:sp>
+      <p:sp>
+        <p:nvSpPr>
+          <p:cNvPr id="3" name="Content Placeholder 2">
+            <a:extLst>
+              <a:ext uri="{FF2B5EF4-FFF2-40B4-BE49-F238E27FC236}">
+                <a16:creationId xmlns:a16="http://schemas.microsoft.com/office/drawing/2014/main" id="{FC8EDCBA-3552-7B68-64F5-3692F67D4E06}"/>
+              </a:ext>
+            </a:extLst>
+          </p:cNvPr>
+          <p:cNvSpPr>
+            <a:spLocks noGrp="1"/>
+          </p:cNvSpPr>
+          <p:nvPr>
+            <p:ph idx="1"/>
+          </p:nvPr>
+        </p:nvSpPr>
+        <p:spPr/>
+        <p:txBody>
+          <a:bodyPr>
+            <a:normAutofit fontScale="92500" lnSpcReduction="20000"/>
+          </a:bodyPr>
+          <a:lstStyle/>
+          <a:p>
+            <a:pPr marL="0" indent="0">
+              <a:buNone/>
+            </a:pPr>
+            <a:r>
+              <a:rPr lang="en-US" dirty="0"/>
+              <a:t>What do we mean by conductivity?</a:t>
+            </a:r>
+          </a:p>
+          <a:p>
+            <a:pPr marL="514350" indent="-514350">
+              <a:buFont typeface="+mj-lt"/>
+              <a:buAutoNum type="alphaLcParenR"/>
+            </a:pPr>
+            <a:r>
+              <a:rPr lang="en-US" dirty="0"/>
+              <a:t>The material properties of the conductor that determine how easy it is for free charge to flow.</a:t>
+            </a:r>
+          </a:p>
+          <a:p>
+            <a:pPr marL="514350" indent="-514350">
+              <a:buFont typeface="+mj-lt"/>
+              <a:buAutoNum type="alphaLcParenR"/>
+            </a:pPr>
+            <a:r>
+              <a:rPr lang="en-US" dirty="0"/>
+              <a:t>The ability of the material to polarize, therefor leaving “extra” charge on the surface forming a surface charge density.</a:t>
+            </a:r>
+          </a:p>
+          <a:p>
+            <a:pPr marL="514350" indent="-514350">
+              <a:buFont typeface="+mj-lt"/>
+              <a:buAutoNum type="alphaLcParenR"/>
+            </a:pPr>
+            <a:r>
+              <a:rPr lang="en-US" dirty="0"/>
+              <a:t>The affinity of the material to have low bound electrons that can contribute to an electric current.</a:t>
+            </a:r>
+          </a:p>
+          <a:p>
+            <a:pPr marL="514350" indent="-514350">
+              <a:buFont typeface="+mj-lt"/>
+              <a:buAutoNum type="alphaLcParenR"/>
+            </a:pPr>
+            <a:r>
+              <a:rPr lang="en-US" dirty="0"/>
+              <a:t>The ability to work for railroad companies as a guide for passengers.</a:t>
+            </a:r>
+          </a:p>
+        </p:txBody>
+      </p:sp>
+    </p:spTree>
+    <p:extLst>
+      <p:ext uri="{BB962C8B-B14F-4D97-AF65-F5344CB8AC3E}">
+        <p14:creationId xmlns:p14="http://schemas.microsoft.com/office/powerpoint/2010/main" val="743479051"/>
+      </p:ext>
+    </p:extLst>
+  </p:cSld>
+  <p:clrMapOvr>
+    <a:masterClrMapping/>
+  </p:clrMapOvr>
+</p:sld>
+</file>
+
+<file path=ppt/slides/slide3.xml><?xml version="1.0" encoding="utf-8"?>
+<p:sld xmlns:a="http://schemas.openxmlformats.org/drawingml/2006/main" xmlns:r="http://schemas.openxmlformats.org/officeDocument/2006/relationships" xmlns:p="http://schemas.openxmlformats.org/presentationml/2006/main">
+  <p:cSld>
+    <p:spTree>
+      <p:nvGrpSpPr>
+        <p:cNvPr id="1" name=""/>
+        <p:cNvGrpSpPr/>
+        <p:nvPr/>
+      </p:nvGrpSpPr>
+      <p:grpSpPr>
+        <a:xfrm>
+          <a:off x="0" y="0"/>
+          <a:ext cx="0" cy="0"/>
+          <a:chOff x="0" y="0"/>
+          <a:chExt cx="0" cy="0"/>
+        </a:xfrm>
+      </p:grpSpPr>
+      <p:sp>
+        <p:nvSpPr>
+          <p:cNvPr id="2" name="Title 1"/>
+          <p:cNvSpPr>
+            <a:spLocks noGrp="1"/>
+          </p:cNvSpPr>
+          <p:nvPr>
+            <p:ph type="title"/>
+          </p:nvPr>
+        </p:nvSpPr>
+        <p:spPr/>
+        <p:txBody>
+          <a:bodyPr/>
+          <a:lstStyle/>
+          <a:p>
+            <a:r>
+              <a:rPr lang="en-US" dirty="0"/>
+              <a:t>Question 223.37.2</a:t>
+            </a:r>
+          </a:p>
+        </p:txBody>
+      </p:sp>
+      <p:sp>
+        <p:nvSpPr>
+          <p:cNvPr id="3" name="Content Placeholder 2"/>
+          <p:cNvSpPr>
+            <a:spLocks noGrp="1"/>
+          </p:cNvSpPr>
+          <p:nvPr>
+            <p:ph idx="1"/>
+          </p:nvPr>
+        </p:nvSpPr>
+        <p:spPr/>
+        <p:txBody>
+          <a:bodyPr>
+            <a:normAutofit/>
+          </a:bodyPr>
+          <a:lstStyle/>
+          <a:p>
+            <a:pPr>
+              <a:buNone/>
+            </a:pPr>
+            <a:r>
+              <a:rPr lang="en-US" dirty="0"/>
+              <a:t>If the conductivity is </a:t>
+            </a:r>
+            <a:r>
+              <a:rPr lang="el-GR" dirty="0"/>
+              <a:t>6.0×10⁷Ω⁻¹</a:t>
+            </a:r>
+            <a:r>
+              <a:rPr lang="en-US" dirty="0"/>
+              <a:t>m⁻¹ what is the resistivity?</a:t>
+            </a:r>
+            <a:r>
+              <a:rPr lang="el-GR" dirty="0"/>
+              <a:t>	</a:t>
+            </a:r>
+            <a:endParaRPr lang="en-US" dirty="0"/>
+          </a:p>
+          <a:p>
+            <a:pPr marL="514350" indent="-514350">
+              <a:buAutoNum type="alphaLcParenR"/>
+            </a:pPr>
+            <a:r>
+              <a:rPr lang="en-US" dirty="0"/>
+              <a:t>1. 6667×10⁻⁸m </a:t>
+            </a:r>
+            <a:r>
+              <a:rPr lang="el-GR" dirty="0"/>
+              <a:t>Ω </a:t>
+            </a:r>
+            <a:endParaRPr lang="en-US" dirty="0"/>
+          </a:p>
+          <a:p>
+            <a:pPr marL="514350" indent="-514350">
+              <a:buFont typeface="Arial" pitchFamily="34" charset="0"/>
+              <a:buAutoNum type="alphaLcParenR"/>
+            </a:pPr>
+            <a:r>
+              <a:rPr lang="en-US" dirty="0"/>
+              <a:t> 3.45×10 ⁻</a:t>
+            </a:r>
+            <a:r>
+              <a:rPr lang="en-US" baseline="30000" dirty="0"/>
+              <a:t>9</a:t>
+            </a:r>
+            <a:r>
+              <a:rPr lang="en-US" dirty="0"/>
+              <a:t> m </a:t>
+            </a:r>
+            <a:r>
+              <a:rPr lang="el-GR" dirty="0"/>
+              <a:t>Ω </a:t>
+            </a:r>
+            <a:endParaRPr lang="en-US" dirty="0"/>
+          </a:p>
+          <a:p>
+            <a:pPr marL="514350" indent="-514350">
+              <a:buFont typeface="Arial" pitchFamily="34" charset="0"/>
+              <a:buAutoNum type="alphaLcParenR"/>
+            </a:pPr>
+            <a:r>
+              <a:rPr lang="en-US" dirty="0"/>
+              <a:t>6.7×10⁸m </a:t>
+            </a:r>
+            <a:r>
+              <a:rPr lang="el-GR" dirty="0"/>
+              <a:t>Ω </a:t>
+            </a:r>
+            <a:endParaRPr lang="en-US" dirty="0"/>
+          </a:p>
+          <a:p>
+            <a:pPr marL="514350" indent="-514350">
+              <a:buFont typeface="Arial" pitchFamily="34" charset="0"/>
+              <a:buAutoNum type="alphaLcParenR"/>
+            </a:pPr>
+            <a:r>
+              <a:rPr lang="en-US" dirty="0"/>
+              <a:t>5.5⁸</a:t>
+            </a:r>
+            <a:r>
+              <a:rPr lang="en-US" baseline="30000" dirty="0"/>
+              <a:t>4</a:t>
+            </a:r>
+            <a:r>
+              <a:rPr lang="en-US" dirty="0"/>
+              <a:t>m </a:t>
+            </a:r>
+            <a:r>
+              <a:rPr lang="el-GR" dirty="0"/>
+              <a:t>Ω </a:t>
+            </a:r>
+            <a:endParaRPr lang="en-US" dirty="0"/>
+          </a:p>
+        </p:txBody>
+      </p:sp>
+      <p:sp>
+        <p:nvSpPr>
+          <p:cNvPr id="4" name="Slide Number Placeholder 3"/>
+          <p:cNvSpPr>
+            <a:spLocks noGrp="1"/>
+          </p:cNvSpPr>
+          <p:nvPr>
+            <p:ph type="sldNum" sz="quarter" idx="12"/>
+          </p:nvPr>
+        </p:nvSpPr>
+        <p:spPr/>
+        <p:txBody>
+          <a:bodyPr/>
+          <a:lstStyle/>
+          <a:p>
+            <a:pPr>
+              <a:defRPr/>
+            </a:pPr>
+            <a:fld id="{64137B81-8888-4253-92EC-0AED2A590749}" type="slidenum">
+              <a:rPr lang="en-US" smtClean="0"/>
+              <a:pPr>
+                <a:defRPr/>
+              </a:pPr>
+              <a:t>3</a:t>
+            </a:fld>
+            <a:endParaRPr lang="en-US"/>
+          </a:p>
+        </p:txBody>
+      </p:sp>
+    </p:spTree>
+  </p:cSld>
+  <p:clrMapOvr>
+    <a:masterClrMapping/>
+  </p:clrMapOvr>
+</p:sld>
+</file>
+
+<file path=ppt/slides/slide4.xml><?xml version="1.0" encoding="utf-8"?>
+<p:sld xmlns:a="http://schemas.openxmlformats.org/drawingml/2006/main" xmlns:r="http://schemas.openxmlformats.org/officeDocument/2006/relationships" xmlns:p="http://schemas.openxmlformats.org/presentationml/2006/main">
+  <p:cSld>
+    <p:spTree>
+      <p:nvGrpSpPr>
+        <p:cNvPr id="1" name=""/>
+        <p:cNvGrpSpPr/>
+        <p:nvPr/>
+      </p:nvGrpSpPr>
+      <p:grpSpPr>
+        <a:xfrm>
+          <a:off x="0" y="0"/>
+          <a:ext cx="0" cy="0"/>
+          <a:chOff x="0" y="0"/>
+          <a:chExt cx="0" cy="0"/>
+        </a:xfrm>
+      </p:grpSpPr>
       <p:pic>
         <p:nvPicPr>
           <p:cNvPr id="2" name="Picture 2"/>
@@ -3127,7 +6088,148 @@
 </p:sld>
 </file>
 
-<file path=ppt/slides/slide2.xml><?xml version="1.0" encoding="utf-8"?>
+<file path=ppt/slides/slide5.xml><?xml version="1.0" encoding="utf-8"?>
+<p:sld xmlns:a="http://schemas.openxmlformats.org/drawingml/2006/main" xmlns:r="http://schemas.openxmlformats.org/officeDocument/2006/relationships" xmlns:p="http://schemas.openxmlformats.org/presentationml/2006/main">
+  <p:cSld>
+    <p:spTree>
+      <p:nvGrpSpPr>
+        <p:cNvPr id="1" name=""/>
+        <p:cNvGrpSpPr/>
+        <p:nvPr/>
+      </p:nvGrpSpPr>
+      <p:grpSpPr>
+        <a:xfrm>
+          <a:off x="0" y="0"/>
+          <a:ext cx="0" cy="0"/>
+          <a:chOff x="0" y="0"/>
+          <a:chExt cx="0" cy="0"/>
+        </a:xfrm>
+      </p:grpSpPr>
+      <p:sp>
+        <p:nvSpPr>
+          <p:cNvPr id="2" name="Title 1"/>
+          <p:cNvSpPr>
+            <a:spLocks noGrp="1"/>
+          </p:cNvSpPr>
+          <p:nvPr>
+            <p:ph type="title"/>
+          </p:nvPr>
+        </p:nvSpPr>
+        <p:spPr/>
+        <p:txBody>
+          <a:bodyPr/>
+          <a:lstStyle/>
+          <a:p>
+            <a:r>
+              <a:rPr lang="en-US" dirty="0"/>
+              <a:t>Question 223.37.3</a:t>
+            </a:r>
+          </a:p>
+        </p:txBody>
+      </p:sp>
+      <p:sp>
+        <p:nvSpPr>
+          <p:cNvPr id="3" name="Content Placeholder 2"/>
+          <p:cNvSpPr>
+            <a:spLocks noGrp="1"/>
+          </p:cNvSpPr>
+          <p:nvPr>
+            <p:ph idx="1"/>
+          </p:nvPr>
+        </p:nvSpPr>
+        <p:spPr/>
+        <p:txBody>
+          <a:bodyPr/>
+          <a:lstStyle/>
+          <a:p>
+            <a:pPr>
+              <a:buNone/>
+            </a:pPr>
+            <a:r>
+              <a:rPr lang="en-US" dirty="0"/>
+              <a:t>The thermal resistivity coefficient for tungsten is 4.5×10⁻³.  As the tungsten heats up, the resistivity will…</a:t>
+            </a:r>
+          </a:p>
+          <a:p>
+            <a:pPr marL="514350" indent="-514350">
+              <a:buFont typeface="+mj-lt"/>
+              <a:buAutoNum type="alphaLcParenR"/>
+            </a:pPr>
+            <a:r>
+              <a:rPr lang="en-US" dirty="0"/>
+              <a:t>increase</a:t>
+            </a:r>
+          </a:p>
+          <a:p>
+            <a:pPr marL="514350" indent="-514350">
+              <a:buFont typeface="+mj-lt"/>
+              <a:buAutoNum type="alphaLcParenR"/>
+            </a:pPr>
+            <a:r>
+              <a:rPr lang="en-US" dirty="0"/>
+              <a:t>decrease</a:t>
+            </a:r>
+          </a:p>
+          <a:p>
+            <a:pPr marL="514350" indent="-514350">
+              <a:buFont typeface="+mj-lt"/>
+              <a:buAutoNum type="alphaLcParenR"/>
+            </a:pPr>
+            <a:r>
+              <a:rPr lang="en-US" dirty="0"/>
+              <a:t>go away</a:t>
+            </a:r>
+          </a:p>
+          <a:p>
+            <a:pPr marL="514350" indent="-514350">
+              <a:buFont typeface="+mj-lt"/>
+              <a:buAutoNum type="alphaLcParenR"/>
+            </a:pPr>
+            <a:r>
+              <a:rPr lang="en-US" dirty="0"/>
+              <a:t>Stay the same</a:t>
+            </a:r>
+          </a:p>
+        </p:txBody>
+      </p:sp>
+      <p:sp>
+        <p:nvSpPr>
+          <p:cNvPr id="4" name="Slide Number Placeholder 3"/>
+          <p:cNvSpPr>
+            <a:spLocks noGrp="1"/>
+          </p:cNvSpPr>
+          <p:nvPr>
+            <p:ph type="sldNum" sz="quarter" idx="12"/>
+          </p:nvPr>
+        </p:nvSpPr>
+        <p:spPr/>
+        <p:txBody>
+          <a:bodyPr/>
+          <a:lstStyle/>
+          <a:p>
+            <a:pPr>
+              <a:defRPr/>
+            </a:pPr>
+            <a:fld id="{64137B81-8888-4253-92EC-0AED2A590749}" type="slidenum">
+              <a:rPr lang="en-US" smtClean="0"/>
+              <a:pPr>
+                <a:defRPr/>
+              </a:pPr>
+              <a:t>5</a:t>
+            </a:fld>
+            <a:endParaRPr lang="en-US"/>
+          </a:p>
+        </p:txBody>
+      </p:sp>
+    </p:spTree>
+  </p:cSld>
+  <p:clrMapOvr>
+    <a:masterClrMapping/>
+  </p:clrMapOvr>
+</p:sld>
+</file>
+
+<file path=ppt/slides/slide6.xml><?xml version="1.0" encoding="utf-8"?>
 <p:sld xmlns:a="http://schemas.openxmlformats.org/drawingml/2006/main" xmlns:r="http://schemas.openxmlformats.org/officeDocument/2006/relationships" xmlns:p="http://schemas.openxmlformats.org/presentationml/2006/main">
   <p:cSld>
     <p:spTree>
@@ -3248,18 +6350,13 @@
           <a:p>
             <a:pPr algn="r"/>
             <a:r>
-              <a:rPr lang="en-US" sz="3200" dirty="0" smtClean="0">
+              <a:rPr lang="en-US" sz="3200" dirty="0">
                 <a:solidFill>
                   <a:schemeClr val="bg1"/>
                 </a:solidFill>
               </a:rPr>
               <a:t>Superconducting fibers</a:t>
             </a:r>
-            <a:endParaRPr lang="en-US" sz="3200" dirty="0">
-              <a:solidFill>
-                <a:schemeClr val="bg1"/>
-              </a:solidFill>
-            </a:endParaRPr>
           </a:p>
         </p:txBody>
       </p:sp>
@@ -3384,7 +6481,157 @@
 </p:sld>
 </file>
 
-<file path=ppt/slides/slide3.xml><?xml version="1.0" encoding="utf-8"?>
+<file path=ppt/slides/slide7.xml><?xml version="1.0" encoding="utf-8"?>
+<p:sld xmlns:a="http://schemas.openxmlformats.org/drawingml/2006/main" xmlns:r="http://schemas.openxmlformats.org/officeDocument/2006/relationships" xmlns:p="http://schemas.openxmlformats.org/presentationml/2006/main">
+  <p:cSld>
+    <p:spTree>
+      <p:nvGrpSpPr>
+        <p:cNvPr id="1" name=""/>
+        <p:cNvGrpSpPr/>
+        <p:nvPr/>
+      </p:nvGrpSpPr>
+      <p:grpSpPr>
+        <a:xfrm>
+          <a:off x="0" y="0"/>
+          <a:ext cx="0" cy="0"/>
+          <a:chOff x="0" y="0"/>
+          <a:chExt cx="0" cy="0"/>
+        </a:xfrm>
+      </p:grpSpPr>
+      <p:sp>
+        <p:nvSpPr>
+          <p:cNvPr id="2" name="Title 1"/>
+          <p:cNvSpPr>
+            <a:spLocks noGrp="1"/>
+          </p:cNvSpPr>
+          <p:nvPr>
+            <p:ph type="title"/>
+          </p:nvPr>
+        </p:nvSpPr>
+        <p:spPr/>
+        <p:txBody>
+          <a:bodyPr/>
+          <a:lstStyle/>
+          <a:p>
+            <a:r>
+              <a:rPr lang="en-US" dirty="0"/>
+              <a:t>Question 223.37.4</a:t>
+            </a:r>
+          </a:p>
+        </p:txBody>
+      </p:sp>
+      <p:sp>
+        <p:nvSpPr>
+          <p:cNvPr id="3" name="Content Placeholder 2"/>
+          <p:cNvSpPr>
+            <a:spLocks noGrp="1"/>
+          </p:cNvSpPr>
+          <p:nvPr>
+            <p:ph idx="1"/>
+          </p:nvPr>
+        </p:nvSpPr>
+        <p:spPr/>
+        <p:txBody>
+          <a:bodyPr>
+            <a:normAutofit/>
+          </a:bodyPr>
+          <a:lstStyle/>
+          <a:p>
+            <a:pPr>
+              <a:buNone/>
+            </a:pPr>
+            <a:r>
+              <a:rPr lang="en-US" dirty="0"/>
+              <a:t>If a wire is cut in half so the wire is now half </a:t>
+            </a:r>
+            <a:r>
+              <a:rPr lang="en-US"/>
+              <a:t>the original  length, </a:t>
+            </a:r>
+            <a:r>
+              <a:rPr lang="en-US" dirty="0"/>
+              <a:t>the resistance of the remaining piece will be </a:t>
+            </a:r>
+          </a:p>
+          <a:p>
+            <a:pPr marL="514350" indent="-514350">
+              <a:buFont typeface="+mj-lt"/>
+              <a:buAutoNum type="alphaLcParenR"/>
+            </a:pPr>
+            <a:r>
+              <a:rPr lang="en-US" dirty="0"/>
+              <a:t>Larger</a:t>
+            </a:r>
+          </a:p>
+          <a:p>
+            <a:pPr marL="514350" indent="-514350">
+              <a:buFont typeface="+mj-lt"/>
+              <a:buAutoNum type="alphaLcParenR"/>
+            </a:pPr>
+            <a:r>
+              <a:rPr lang="en-US" dirty="0"/>
+              <a:t>Smaller</a:t>
+            </a:r>
+          </a:p>
+          <a:p>
+            <a:pPr marL="514350" indent="-514350">
+              <a:buFont typeface="+mj-lt"/>
+              <a:buAutoNum type="alphaLcParenR"/>
+            </a:pPr>
+            <a:r>
+              <a:rPr lang="en-US" dirty="0"/>
+              <a:t>The same</a:t>
+            </a:r>
+          </a:p>
+          <a:p>
+            <a:pPr marL="514350" indent="-514350">
+              <a:buNone/>
+            </a:pPr>
+            <a:r>
+              <a:rPr lang="en-US" dirty="0"/>
+              <a:t>As that of the whole piece</a:t>
+            </a:r>
+          </a:p>
+        </p:txBody>
+      </p:sp>
+      <p:sp>
+        <p:nvSpPr>
+          <p:cNvPr id="4" name="Slide Number Placeholder 3"/>
+          <p:cNvSpPr>
+            <a:spLocks noGrp="1"/>
+          </p:cNvSpPr>
+          <p:nvPr>
+            <p:ph type="sldNum" sz="quarter" idx="12"/>
+          </p:nvPr>
+        </p:nvSpPr>
+        <p:spPr/>
+        <p:txBody>
+          <a:bodyPr/>
+          <a:lstStyle/>
+          <a:p>
+            <a:pPr>
+              <a:defRPr/>
+            </a:pPr>
+            <a:fld id="{64137B81-8888-4253-92EC-0AED2A590749}" type="slidenum">
+              <a:rPr lang="en-US" smtClean="0"/>
+              <a:pPr>
+                <a:defRPr/>
+              </a:pPr>
+              <a:t>7</a:t>
+            </a:fld>
+            <a:endParaRPr lang="en-US"/>
+          </a:p>
+        </p:txBody>
+      </p:sp>
+    </p:spTree>
+  </p:cSld>
+  <p:clrMapOvr>
+    <a:masterClrMapping/>
+  </p:clrMapOvr>
+</p:sld>
+</file>
+
+<file path=ppt/slides/slide8.xml><?xml version="1.0" encoding="utf-8"?>
 <p:sld xmlns:a="http://schemas.openxmlformats.org/drawingml/2006/main" xmlns:r="http://schemas.openxmlformats.org/officeDocument/2006/relationships" xmlns:p="http://schemas.openxmlformats.org/presentationml/2006/main">
   <p:cSld>
     <p:spTree>
@@ -3480,7 +6727,7 @@
 </p:sld>
 </file>
 
-<file path=ppt/slides/slide4.xml><?xml version="1.0" encoding="utf-8"?>
+<file path=ppt/slides/slide9.xml><?xml version="1.0" encoding="utf-8"?>
 <p:sld xmlns:a="http://schemas.openxmlformats.org/drawingml/2006/main" xmlns:r="http://schemas.openxmlformats.org/officeDocument/2006/relationships" xmlns:p="http://schemas.openxmlformats.org/presentationml/2006/main">
   <p:cSld>
     <p:spTree>
@@ -3554,180 +6801,6 @@
           <a:xfrm>
             <a:off x="457200" y="283058"/>
             <a:ext cx="8336280" cy="6373444"/>
-          </a:xfrm>
-          <a:prstGeom prst="rect">
-            <a:avLst/>
-          </a:prstGeom>
-          <a:noFill/>
-          <a:ln w="9525">
-            <a:noFill/>
-            <a:miter lim="800000"/>
-            <a:headEnd/>
-            <a:tailEnd/>
-          </a:ln>
-          <a:effectLst/>
-        </p:spPr>
-      </p:pic>
-    </p:spTree>
-  </p:cSld>
-  <p:clrMapOvr>
-    <a:masterClrMapping/>
-  </p:clrMapOvr>
-</p:sld>
-</file>
-
-<file path=ppt/slides/slide5.xml><?xml version="1.0" encoding="utf-8"?>
-<p:sld xmlns:a="http://schemas.openxmlformats.org/drawingml/2006/main" xmlns:r="http://schemas.openxmlformats.org/officeDocument/2006/relationships" xmlns:p="http://schemas.openxmlformats.org/presentationml/2006/main">
-  <p:cSld>
-    <p:spTree>
-      <p:nvGrpSpPr>
-        <p:cNvPr id="1" name=""/>
-        <p:cNvGrpSpPr/>
-        <p:nvPr/>
-      </p:nvGrpSpPr>
-      <p:grpSpPr>
-        <a:xfrm>
-          <a:off x="0" y="0"/>
-          <a:ext cx="0" cy="0"/>
-          <a:chOff x="0" y="0"/>
-          <a:chExt cx="0" cy="0"/>
-        </a:xfrm>
-      </p:grpSpPr>
-      <p:pic>
-        <p:nvPicPr>
-          <p:cNvPr id="3074" name="Picture 2"/>
-          <p:cNvPicPr>
-            <a:picLocks noChangeAspect="1" noChangeArrowheads="1"/>
-          </p:cNvPicPr>
-          <p:nvPr/>
-        </p:nvPicPr>
-        <p:blipFill>
-          <a:blip r:embed="rId2" cstate="print"/>
-          <a:srcRect/>
-          <a:stretch>
-            <a:fillRect/>
-          </a:stretch>
-        </p:blipFill>
-        <p:spPr bwMode="auto">
-          <a:xfrm>
-            <a:off x="1143000" y="456288"/>
-            <a:ext cx="6720839" cy="5827861"/>
-          </a:xfrm>
-          <a:prstGeom prst="rect">
-            <a:avLst/>
-          </a:prstGeom>
-          <a:noFill/>
-          <a:ln w="9525">
-            <a:noFill/>
-            <a:miter lim="800000"/>
-            <a:headEnd/>
-            <a:tailEnd/>
-          </a:ln>
-          <a:effectLst/>
-        </p:spPr>
-      </p:pic>
-    </p:spTree>
-  </p:cSld>
-  <p:clrMapOvr>
-    <a:masterClrMapping/>
-  </p:clrMapOvr>
-</p:sld>
-</file>
-
-<file path=ppt/slides/slide6.xml><?xml version="1.0" encoding="utf-8"?>
-<p:sld xmlns:a="http://schemas.openxmlformats.org/drawingml/2006/main" xmlns:r="http://schemas.openxmlformats.org/officeDocument/2006/relationships" xmlns:p="http://schemas.openxmlformats.org/presentationml/2006/main">
-  <p:cSld>
-    <p:spTree>
-      <p:nvGrpSpPr>
-        <p:cNvPr id="1" name=""/>
-        <p:cNvGrpSpPr/>
-        <p:nvPr/>
-      </p:nvGrpSpPr>
-      <p:grpSpPr>
-        <a:xfrm>
-          <a:off x="0" y="0"/>
-          <a:ext cx="0" cy="0"/>
-          <a:chOff x="0" y="0"/>
-          <a:chExt cx="0" cy="0"/>
-        </a:xfrm>
-      </p:grpSpPr>
-      <p:pic>
-        <p:nvPicPr>
-          <p:cNvPr id="4098" name="Picture 2"/>
-          <p:cNvPicPr>
-            <a:picLocks noChangeAspect="1" noChangeArrowheads="1"/>
-          </p:cNvPicPr>
-          <p:nvPr/>
-        </p:nvPicPr>
-        <p:blipFill>
-          <a:blip r:embed="rId2" cstate="print"/>
-          <a:srcRect/>
-          <a:stretch>
-            <a:fillRect/>
-          </a:stretch>
-        </p:blipFill>
-        <p:spPr bwMode="auto">
-          <a:xfrm>
-            <a:off x="1038600" y="365760"/>
-            <a:ext cx="6855719" cy="5944821"/>
-          </a:xfrm>
-          <a:prstGeom prst="rect">
-            <a:avLst/>
-          </a:prstGeom>
-          <a:noFill/>
-          <a:ln w="9525">
-            <a:noFill/>
-            <a:miter lim="800000"/>
-            <a:headEnd/>
-            <a:tailEnd/>
-          </a:ln>
-          <a:effectLst/>
-        </p:spPr>
-      </p:pic>
-    </p:spTree>
-  </p:cSld>
-  <p:clrMapOvr>
-    <a:masterClrMapping/>
-  </p:clrMapOvr>
-</p:sld>
-</file>
-
-<file path=ppt/slides/slide7.xml><?xml version="1.0" encoding="utf-8"?>
-<p:sld xmlns:a="http://schemas.openxmlformats.org/drawingml/2006/main" xmlns:r="http://schemas.openxmlformats.org/officeDocument/2006/relationships" xmlns:p="http://schemas.openxmlformats.org/presentationml/2006/main">
-  <p:cSld>
-    <p:spTree>
-      <p:nvGrpSpPr>
-        <p:cNvPr id="1" name=""/>
-        <p:cNvGrpSpPr/>
-        <p:nvPr/>
-      </p:nvGrpSpPr>
-      <p:grpSpPr>
-        <a:xfrm>
-          <a:off x="0" y="0"/>
-          <a:ext cx="0" cy="0"/>
-          <a:chOff x="0" y="0"/>
-          <a:chExt cx="0" cy="0"/>
-        </a:xfrm>
-      </p:grpSpPr>
-      <p:pic>
-        <p:nvPicPr>
-          <p:cNvPr id="1026" name="Picture 2"/>
-          <p:cNvPicPr>
-            <a:picLocks noChangeAspect="1" noChangeArrowheads="1"/>
-          </p:cNvPicPr>
-          <p:nvPr/>
-        </p:nvPicPr>
-        <p:blipFill>
-          <a:blip r:embed="rId2" cstate="print"/>
-          <a:srcRect/>
-          <a:stretch>
-            <a:fillRect/>
-          </a:stretch>
-        </p:blipFill>
-        <p:spPr bwMode="auto">
-          <a:xfrm>
-            <a:off x="899160" y="983618"/>
-            <a:ext cx="7702265" cy="5127622"/>
           </a:xfrm>
           <a:prstGeom prst="rect">
             <a:avLst/>
@@ -4031,4 +7104,299 @@
   <a:objectDefaults/>
   <a:extraClrSchemeLst/>
 </a:theme>
+</file>
+
+<file path=ppt/theme/theme2.xml><?xml version="1.0" encoding="utf-8"?>
+<a:theme xmlns:a="http://schemas.openxmlformats.org/drawingml/2006/main" name="Office Theme">
+  <a:themeElements>
+    <a:clrScheme name="Office">
+      <a:dk1>
+        <a:sysClr val="windowText" lastClr="000000"/>
+      </a:dk1>
+      <a:lt1>
+        <a:sysClr val="window" lastClr="FFFFFF"/>
+      </a:lt1>
+      <a:dk2>
+        <a:srgbClr val="44546A"/>
+      </a:dk2>
+      <a:lt2>
+        <a:srgbClr val="E7E6E6"/>
+      </a:lt2>
+      <a:accent1>
+        <a:srgbClr val="4472C4"/>
+      </a:accent1>
+      <a:accent2>
+        <a:srgbClr val="ED7D31"/>
+      </a:accent2>
+      <a:accent3>
+        <a:srgbClr val="A5A5A5"/>
+      </a:accent3>
+      <a:accent4>
+        <a:srgbClr val="FFC000"/>
+      </a:accent4>
+      <a:accent5>
+        <a:srgbClr val="5B9BD5"/>
+      </a:accent5>
+      <a:accent6>
+        <a:srgbClr val="70AD47"/>
+      </a:accent6>
+      <a:hlink>
+        <a:srgbClr val="0563C1"/>
+      </a:hlink>
+      <a:folHlink>
+        <a:srgbClr val="954F72"/>
+      </a:folHlink>
+    </a:clrScheme>
+    <a:fontScheme name="Office">
+      <a:majorFont>
+        <a:latin typeface="Calibri Light" panose="020F0302020204030204"/>
+        <a:ea typeface=""/>
+        <a:cs typeface=""/>
+        <a:font script="Jpan" typeface="游ゴシック Light"/>
+        <a:font script="Hang" typeface="맑은 고딕"/>
+        <a:font script="Hans" typeface="等线 Light"/>
+        <a:font script="Hant" typeface="新細明體"/>
+        <a:font script="Arab" typeface="Times New Roman"/>
+        <a:font script="Hebr" typeface="Times New Roman"/>
+        <a:font script="Thai" typeface="Angsana New"/>
+        <a:font script="Ethi" typeface="Nyala"/>
+        <a:font script="Beng" typeface="Vrinda"/>
+        <a:font script="Gujr" typeface="Shruti"/>
+        <a:font script="Khmr" typeface="MoolBoran"/>
+        <a:font script="Knda" typeface="Tunga"/>
+        <a:font script="Guru" typeface="Raavi"/>
+        <a:font script="Cans" typeface="Euphemia"/>
+        <a:font script="Cher" typeface="Plantagenet Cherokee"/>
+        <a:font script="Yiii" typeface="Microsoft Yi Baiti"/>
+        <a:font script="Tibt" typeface="Microsoft Himalaya"/>
+        <a:font script="Thaa" typeface="MV Boli"/>
+        <a:font script="Deva" typeface="Mangal"/>
+        <a:font script="Telu" typeface="Gautami"/>
+        <a:font script="Taml" typeface="Latha"/>
+        <a:font script="Syrc" typeface="Estrangelo Edessa"/>
+        <a:font script="Orya" typeface="Kalinga"/>
+        <a:font script="Mlym" typeface="Kartika"/>
+        <a:font script="Laoo" typeface="DokChampa"/>
+        <a:font script="Sinh" typeface="Iskoola Pota"/>
+        <a:font script="Mong" typeface="Mongolian Baiti"/>
+        <a:font script="Viet" typeface="Times New Roman"/>
+        <a:font script="Uigh" typeface="Microsoft Uighur"/>
+        <a:font script="Geor" typeface="Sylfaen"/>
+        <a:font script="Armn" typeface="Arial"/>
+        <a:font script="Bugi" typeface="Leelawadee UI"/>
+        <a:font script="Bopo" typeface="Microsoft JhengHei"/>
+        <a:font script="Java" typeface="Javanese Text"/>
+        <a:font script="Lisu" typeface="Segoe UI"/>
+        <a:font script="Mymr" typeface="Myanmar Text"/>
+        <a:font script="Nkoo" typeface="Ebrima"/>
+        <a:font script="Olck" typeface="Nirmala UI"/>
+        <a:font script="Osma" typeface="Ebrima"/>
+        <a:font script="Phag" typeface="Phagspa"/>
+        <a:font script="Syrn" typeface="Estrangelo Edessa"/>
+        <a:font script="Syrj" typeface="Estrangelo Edessa"/>
+        <a:font script="Syre" typeface="Estrangelo Edessa"/>
+        <a:font script="Sora" typeface="Nirmala UI"/>
+        <a:font script="Tale" typeface="Microsoft Tai Le"/>
+        <a:font script="Talu" typeface="Microsoft New Tai Lue"/>
+        <a:font script="Tfng" typeface="Ebrima"/>
+      </a:majorFont>
+      <a:minorFont>
+        <a:latin typeface="Calibri" panose="020F0502020204030204"/>
+        <a:ea typeface=""/>
+        <a:cs typeface=""/>
+        <a:font script="Jpan" typeface="游ゴシック"/>
+        <a:font script="Hang" typeface="맑은 고딕"/>
+        <a:font script="Hans" typeface="等线"/>
+        <a:font script="Hant" typeface="新細明體"/>
+        <a:font script="Arab" typeface="Arial"/>
+        <a:font script="Hebr" typeface="Arial"/>
+        <a:font script="Thai" typeface="Cordia New"/>
+        <a:font script="Ethi" typeface="Nyala"/>
+        <a:font script="Beng" typeface="Vrinda"/>
+        <a:font script="Gujr" typeface="Shruti"/>
+        <a:font script="Khmr" typeface="DaunPenh"/>
+        <a:font script="Knda" typeface="Tunga"/>
+        <a:font script="Guru" typeface="Raavi"/>
+        <a:font script="Cans" typeface="Euphemia"/>
+        <a:font script="Cher" typeface="Plantagenet Cherokee"/>
+        <a:font script="Yiii" typeface="Microsoft Yi Baiti"/>
+        <a:font script="Tibt" typeface="Microsoft Himalaya"/>
+        <a:font script="Thaa" typeface="MV Boli"/>
+        <a:font script="Deva" typeface="Mangal"/>
+        <a:font script="Telu" typeface="Gautami"/>
+        <a:font script="Taml" typeface="Latha"/>
+        <a:font script="Syrc" typeface="Estrangelo Edessa"/>
+        <a:font script="Orya" typeface="Kalinga"/>
+        <a:font script="Mlym" typeface="Kartika"/>
+        <a:font script="Laoo" typeface="DokChampa"/>
+        <a:font script="Sinh" typeface="Iskoola Pota"/>
+        <a:font script="Mong" typeface="Mongolian Baiti"/>
+        <a:font script="Viet" typeface="Arial"/>
+        <a:font script="Uigh" typeface="Microsoft Uighur"/>
+        <a:font script="Geor" typeface="Sylfaen"/>
+        <a:font script="Armn" typeface="Arial"/>
+        <a:font script="Bugi" typeface="Leelawadee UI"/>
+        <a:font script="Bopo" typeface="Microsoft JhengHei"/>
+        <a:font script="Java" typeface="Javanese Text"/>
+        <a:font script="Lisu" typeface="Segoe UI"/>
+        <a:font script="Mymr" typeface="Myanmar Text"/>
+        <a:font script="Nkoo" typeface="Ebrima"/>
+        <a:font script="Olck" typeface="Nirmala UI"/>
+        <a:font script="Osma" typeface="Ebrima"/>
+        <a:font script="Phag" typeface="Phagspa"/>
+        <a:font script="Syrn" typeface="Estrangelo Edessa"/>
+        <a:font script="Syrj" typeface="Estrangelo Edessa"/>
+        <a:font script="Syre" typeface="Estrangelo Edessa"/>
+        <a:font script="Sora" typeface="Nirmala UI"/>
+        <a:font script="Tale" typeface="Microsoft Tai Le"/>
+        <a:font script="Talu" typeface="Microsoft New Tai Lue"/>
+        <a:font script="Tfng" typeface="Ebrima"/>
+      </a:minorFont>
+    </a:fontScheme>
+    <a:fmtScheme name="Office">
+      <a:fillStyleLst>
+        <a:solidFill>
+          <a:schemeClr val="phClr"/>
+        </a:solidFill>
+        <a:gradFill rotWithShape="1">
+          <a:gsLst>
+            <a:gs pos="0">
+              <a:schemeClr val="phClr">
+                <a:lumMod val="110000"/>
+                <a:satMod val="105000"/>
+                <a:tint val="67000"/>
+              </a:schemeClr>
+            </a:gs>
+            <a:gs pos="50000">
+              <a:schemeClr val="phClr">
+                <a:lumMod val="105000"/>
+                <a:satMod val="103000"/>
+                <a:tint val="73000"/>
+              </a:schemeClr>
+            </a:gs>
+            <a:gs pos="100000">
+              <a:schemeClr val="phClr">
+                <a:lumMod val="105000"/>
+                <a:satMod val="109000"/>
+                <a:tint val="81000"/>
+              </a:schemeClr>
+            </a:gs>
+          </a:gsLst>
+          <a:lin ang="5400000" scaled="0"/>
+        </a:gradFill>
+        <a:gradFill rotWithShape="1">
+          <a:gsLst>
+            <a:gs pos="0">
+              <a:schemeClr val="phClr">
+                <a:satMod val="103000"/>
+                <a:lumMod val="102000"/>
+                <a:tint val="94000"/>
+              </a:schemeClr>
+            </a:gs>
+            <a:gs pos="50000">
+              <a:schemeClr val="phClr">
+                <a:satMod val="110000"/>
+                <a:lumMod val="100000"/>
+                <a:shade val="100000"/>
+              </a:schemeClr>
+            </a:gs>
+            <a:gs pos="100000">
+              <a:schemeClr val="phClr">
+                <a:lumMod val="99000"/>
+                <a:satMod val="120000"/>
+                <a:shade val="78000"/>
+              </a:schemeClr>
+            </a:gs>
+          </a:gsLst>
+          <a:lin ang="5400000" scaled="0"/>
+        </a:gradFill>
+      </a:fillStyleLst>
+      <a:lnStyleLst>
+        <a:ln w="6350" cap="flat" cmpd="sng" algn="ctr">
+          <a:solidFill>
+            <a:schemeClr val="phClr"/>
+          </a:solidFill>
+          <a:prstDash val="solid"/>
+          <a:miter lim="800000"/>
+        </a:ln>
+        <a:ln w="12700" cap="flat" cmpd="sng" algn="ctr">
+          <a:solidFill>
+            <a:schemeClr val="phClr"/>
+          </a:solidFill>
+          <a:prstDash val="solid"/>
+          <a:miter lim="800000"/>
+        </a:ln>
+        <a:ln w="19050" cap="flat" cmpd="sng" algn="ctr">
+          <a:solidFill>
+            <a:schemeClr val="phClr"/>
+          </a:solidFill>
+          <a:prstDash val="solid"/>
+          <a:miter lim="800000"/>
+        </a:ln>
+      </a:lnStyleLst>
+      <a:effectStyleLst>
+        <a:effectStyle>
+          <a:effectLst/>
+        </a:effectStyle>
+        <a:effectStyle>
+          <a:effectLst/>
+        </a:effectStyle>
+        <a:effectStyle>
+          <a:effectLst>
+            <a:outerShdw blurRad="57150" dist="19050" dir="5400000" algn="ctr" rotWithShape="0">
+              <a:srgbClr val="000000">
+                <a:alpha val="63000"/>
+              </a:srgbClr>
+            </a:outerShdw>
+          </a:effectLst>
+        </a:effectStyle>
+      </a:effectStyleLst>
+      <a:bgFillStyleLst>
+        <a:solidFill>
+          <a:schemeClr val="phClr"/>
+        </a:solidFill>
+        <a:solidFill>
+          <a:schemeClr val="phClr">
+            <a:tint val="95000"/>
+            <a:satMod val="170000"/>
+          </a:schemeClr>
+        </a:solidFill>
+        <a:gradFill rotWithShape="1">
+          <a:gsLst>
+            <a:gs pos="0">
+              <a:schemeClr val="phClr">
+                <a:tint val="93000"/>
+                <a:satMod val="150000"/>
+                <a:shade val="98000"/>
+                <a:lumMod val="102000"/>
+              </a:schemeClr>
+            </a:gs>
+            <a:gs pos="50000">
+              <a:schemeClr val="phClr">
+                <a:tint val="98000"/>
+                <a:satMod val="130000"/>
+                <a:shade val="90000"/>
+                <a:lumMod val="103000"/>
+              </a:schemeClr>
+            </a:gs>
+            <a:gs pos="100000">
+              <a:schemeClr val="phClr">
+                <a:shade val="63000"/>
+                <a:satMod val="120000"/>
+              </a:schemeClr>
+            </a:gs>
+          </a:gsLst>
+          <a:lin ang="5400000" scaled="0"/>
+        </a:gradFill>
+      </a:bgFillStyleLst>
+    </a:fmtScheme>
+  </a:themeElements>
+  <a:objectDefaults/>
+  <a:extraClrSchemeLst/>
+  <a:extLst>
+    <a:ext uri="{05A4C25C-085E-4340-85A3-A5531E510DB2}">
+      <thm15:themeFamily xmlns:thm15="http://schemas.microsoft.com/office/thememl/2012/main" name="Office Theme" id="{62F939B6-93AF-4DB8-9C6B-D6C7DFDC589F}" vid="{4A3C46E8-61CC-4603-A589-7422A47A8E4A}"/>
+    </a:ext>
+  </a:extLst>
+</a:theme>
 </file>
</xml_diff>